<commit_message>
Update Son content in doc file, update code, readme, usermanual
</commit_message>
<xml_diff>
--- a/MySEProject/Documentation/ML22-23-8 Implement the SDR representation in the MAUI application.pptx
+++ b/MySEProject/Documentation/ML22-23-8 Implement the SDR representation in the MAUI application.pptx
@@ -5,26 +5,25 @@
     <p:sldMasterId id="2147483648" r:id="rId1"/>
   </p:sldMasterIdLst>
   <p:notesMasterIdLst>
-    <p:notesMasterId r:id="rId19"/>
+    <p:notesMasterId r:id="rId18"/>
   </p:notesMasterIdLst>
   <p:sldIdLst>
     <p:sldId id="260" r:id="rId2"/>
-    <p:sldId id="263" r:id="rId3"/>
-    <p:sldId id="289" r:id="rId4"/>
-    <p:sldId id="301" r:id="rId5"/>
+    <p:sldId id="313" r:id="rId3"/>
+    <p:sldId id="263" r:id="rId4"/>
+    <p:sldId id="289" r:id="rId5"/>
     <p:sldId id="290" r:id="rId6"/>
     <p:sldId id="306" r:id="rId7"/>
-    <p:sldId id="303" r:id="rId8"/>
-    <p:sldId id="311" r:id="rId9"/>
-    <p:sldId id="302" r:id="rId10"/>
-    <p:sldId id="310" r:id="rId11"/>
-    <p:sldId id="304" r:id="rId12"/>
-    <p:sldId id="308" r:id="rId13"/>
-    <p:sldId id="309" r:id="rId14"/>
-    <p:sldId id="305" r:id="rId15"/>
-    <p:sldId id="284" r:id="rId16"/>
-    <p:sldId id="285" r:id="rId17"/>
-    <p:sldId id="286" r:id="rId18"/>
+    <p:sldId id="311" r:id="rId8"/>
+    <p:sldId id="302" r:id="rId9"/>
+    <p:sldId id="310" r:id="rId10"/>
+    <p:sldId id="304" r:id="rId11"/>
+    <p:sldId id="308" r:id="rId12"/>
+    <p:sldId id="309" r:id="rId13"/>
+    <p:sldId id="305" r:id="rId14"/>
+    <p:sldId id="284" r:id="rId15"/>
+    <p:sldId id="285" r:id="rId16"/>
+    <p:sldId id="286" r:id="rId17"/>
   </p:sldIdLst>
   <p:sldSz cx="9144000" cy="6858000" type="screen4x3"/>
   <p:notesSz cx="6858000" cy="9144000"/>
@@ -125,7 +124,7 @@
   </p:defaultTextStyle>
   <p:extLst>
     <p:ext uri="{EFAFB233-063F-42B5-8137-9DF3F51BA10A}">
-      <p15:sldGuideLst xmlns:p15="http://schemas.microsoft.com/office/powerpoint/2012/main" xmlns="">
+      <p15:sldGuideLst xmlns="" xmlns:p15="http://schemas.microsoft.com/office/powerpoint/2012/main">
         <p15:guide id="1" orient="horz" pos="2160">
           <p15:clr>
             <a:srgbClr val="A4A3A4"/>
@@ -224,7 +223,7 @@
           <a:p>
             <a:fld id="{0DD56E9B-AA6C-4565-9E7F-312A352AD703}" type="datetimeFigureOut">
               <a:rPr lang="en-GB" smtClean="0"/>
-              <a:t>28/03/2024</a:t>
+              <a:t>29/03/2024</a:t>
             </a:fld>
             <a:endParaRPr lang="en-GB"/>
           </a:p>
@@ -928,115 +927,6 @@
   <p:cSld>
     <p:spTree>
       <p:nvGrpSpPr>
-        <p:cNvPr id="1" name="Shape 477"/>
-        <p:cNvGrpSpPr/>
-        <p:nvPr/>
-      </p:nvGrpSpPr>
-      <p:grpSpPr>
-        <a:xfrm>
-          <a:off x="0" y="0"/>
-          <a:ext cx="0" cy="0"/>
-          <a:chOff x="0" y="0"/>
-          <a:chExt cx="0" cy="0"/>
-        </a:xfrm>
-      </p:grpSpPr>
-      <p:sp>
-        <p:nvSpPr>
-          <p:cNvPr id="478" name="Google Shape;478;g155dbe401f8_0_909:notes"/>
-          <p:cNvSpPr>
-            <a:spLocks noGrp="1" noRot="1" noChangeAspect="1"/>
-          </p:cNvSpPr>
-          <p:nvPr>
-            <p:ph type="sldImg" idx="2"/>
-          </p:nvPr>
-        </p:nvSpPr>
-        <p:spPr>
-          <a:xfrm>
-            <a:off x="1143000" y="685800"/>
-            <a:ext cx="4572000" cy="3429000"/>
-          </a:xfrm>
-          <a:custGeom>
-            <a:avLst/>
-            <a:gdLst/>
-            <a:ahLst/>
-            <a:cxnLst/>
-            <a:rect l="l" t="t" r="r" b="b"/>
-            <a:pathLst>
-              <a:path w="120000" h="120000" extrusionOk="0">
-                <a:moveTo>
-                  <a:pt x="0" y="0"/>
-                </a:moveTo>
-                <a:lnTo>
-                  <a:pt x="120000" y="0"/>
-                </a:lnTo>
-                <a:lnTo>
-                  <a:pt x="120000" y="120000"/>
-                </a:lnTo>
-                <a:lnTo>
-                  <a:pt x="0" y="120000"/>
-                </a:lnTo>
-                <a:close/>
-              </a:path>
-            </a:pathLst>
-          </a:custGeom>
-        </p:spPr>
-      </p:sp>
-      <p:sp>
-        <p:nvSpPr>
-          <p:cNvPr id="479" name="Google Shape;479;g155dbe401f8_0_909:notes"/>
-          <p:cNvSpPr txBox="1">
-            <a:spLocks noGrp="1"/>
-          </p:cNvSpPr>
-          <p:nvPr>
-            <p:ph type="body" idx="1"/>
-          </p:nvPr>
-        </p:nvSpPr>
-        <p:spPr>
-          <a:xfrm>
-            <a:off x="685800" y="4343400"/>
-            <a:ext cx="5486400" cy="4114800"/>
-          </a:xfrm>
-          <a:prstGeom prst="rect">
-            <a:avLst/>
-          </a:prstGeom>
-        </p:spPr>
-        <p:txBody>
-          <a:bodyPr spcFirstLastPara="1" wrap="square" lIns="91425" tIns="91425" rIns="91425" bIns="91425" anchor="t" anchorCtr="0">
-            <a:noAutofit/>
-          </a:bodyPr>
-          <a:lstStyle/>
-          <a:p>
-            <a:pPr marL="0" lvl="0" indent="0" algn="l" rtl="0">
-              <a:spcBef>
-                <a:spcPts val="0"/>
-              </a:spcBef>
-              <a:spcAft>
-                <a:spcPts val="0"/>
-              </a:spcAft>
-              <a:buNone/>
-            </a:pPr>
-            <a:endParaRPr/>
-          </a:p>
-        </p:txBody>
-      </p:sp>
-    </p:spTree>
-    <p:extLst>
-      <p:ext uri="{BB962C8B-B14F-4D97-AF65-F5344CB8AC3E}">
-        <p14:creationId xmlns:p14="http://schemas.microsoft.com/office/powerpoint/2010/main" val="2143849999"/>
-      </p:ext>
-    </p:extLst>
-  </p:cSld>
-  <p:clrMapOvr>
-    <a:masterClrMapping/>
-  </p:clrMapOvr>
-</p:notes>
-</file>
-
-<file path=ppt/notesSlides/notesSlide14.xml><?xml version="1.0" encoding="utf-8"?>
-<p:notes xmlns:a="http://schemas.openxmlformats.org/drawingml/2006/main" xmlns:r="http://schemas.openxmlformats.org/officeDocument/2006/relationships" xmlns:p="http://schemas.openxmlformats.org/presentationml/2006/main" showMasterSp="0" showMasterPhAnim="0">
-  <p:cSld>
-    <p:spTree>
-      <p:nvGrpSpPr>
         <p:cNvPr id="1" name="Shape 924"/>
         <p:cNvGrpSpPr/>
         <p:nvPr/>
@@ -1154,7 +1044,7 @@
 </p:notes>
 </file>
 
-<file path=ppt/notesSlides/notesSlide15.xml><?xml version="1.0" encoding="utf-8"?>
+<file path=ppt/notesSlides/notesSlide14.xml><?xml version="1.0" encoding="utf-8"?>
 <p:notes xmlns:a="http://schemas.openxmlformats.org/drawingml/2006/main" xmlns:r="http://schemas.openxmlformats.org/officeDocument/2006/relationships" xmlns:p="http://schemas.openxmlformats.org/presentationml/2006/main" showMasterSp="0" showMasterPhAnim="0">
   <p:cSld>
     <p:spTree>
@@ -1276,7 +1166,7 @@
 </p:notes>
 </file>
 
-<file path=ppt/notesSlides/notesSlide16.xml><?xml version="1.0" encoding="utf-8"?>
+<file path=ppt/notesSlides/notesSlide15.xml><?xml version="1.0" encoding="utf-8"?>
 <p:notes xmlns:a="http://schemas.openxmlformats.org/drawingml/2006/main" xmlns:r="http://schemas.openxmlformats.org/officeDocument/2006/relationships" xmlns:p="http://schemas.openxmlformats.org/presentationml/2006/main" showMasterSp="0" showMasterPhAnim="0">
   <p:cSld>
     <p:spTree>
@@ -1403,6 +1293,128 @@
   <p:cSld>
     <p:spTree>
       <p:nvGrpSpPr>
+        <p:cNvPr id="1" name="Shape 157"/>
+        <p:cNvGrpSpPr/>
+        <p:nvPr/>
+      </p:nvGrpSpPr>
+      <p:grpSpPr>
+        <a:xfrm>
+          <a:off x="0" y="0"/>
+          <a:ext cx="0" cy="0"/>
+          <a:chOff x="0" y="0"/>
+          <a:chExt cx="0" cy="0"/>
+        </a:xfrm>
+      </p:grpSpPr>
+      <p:sp>
+        <p:nvSpPr>
+          <p:cNvPr id="158" name="Google Shape;158;p2:notes"/>
+          <p:cNvSpPr>
+            <a:spLocks noGrp="1" noRot="1" noChangeAspect="1"/>
+          </p:cNvSpPr>
+          <p:nvPr>
+            <p:ph type="sldImg" idx="2"/>
+          </p:nvPr>
+        </p:nvSpPr>
+        <p:spPr>
+          <a:xfrm>
+            <a:off x="1143000" y="685800"/>
+            <a:ext cx="4572000" cy="3429000"/>
+          </a:xfrm>
+          <a:custGeom>
+            <a:avLst/>
+            <a:gdLst/>
+            <a:ahLst/>
+            <a:cxnLst/>
+            <a:rect l="l" t="t" r="r" b="b"/>
+            <a:pathLst>
+              <a:path w="120000" h="120000" extrusionOk="0">
+                <a:moveTo>
+                  <a:pt x="0" y="0"/>
+                </a:moveTo>
+                <a:lnTo>
+                  <a:pt x="120000" y="0"/>
+                </a:lnTo>
+                <a:lnTo>
+                  <a:pt x="120000" y="120000"/>
+                </a:lnTo>
+                <a:lnTo>
+                  <a:pt x="0" y="120000"/>
+                </a:lnTo>
+                <a:close/>
+              </a:path>
+            </a:pathLst>
+          </a:custGeom>
+          <a:noFill/>
+          <a:ln w="9525" cap="flat" cmpd="sng">
+            <a:solidFill>
+              <a:srgbClr val="000000"/>
+            </a:solidFill>
+            <a:prstDash val="solid"/>
+            <a:round/>
+            <a:headEnd type="none" w="sm" len="sm"/>
+            <a:tailEnd type="none" w="sm" len="sm"/>
+          </a:ln>
+        </p:spPr>
+      </p:sp>
+      <p:sp>
+        <p:nvSpPr>
+          <p:cNvPr id="159" name="Google Shape;159;p2:notes"/>
+          <p:cNvSpPr txBox="1">
+            <a:spLocks noGrp="1"/>
+          </p:cNvSpPr>
+          <p:nvPr>
+            <p:ph type="body" idx="1"/>
+          </p:nvPr>
+        </p:nvSpPr>
+        <p:spPr>
+          <a:xfrm>
+            <a:off x="685800" y="4343400"/>
+            <a:ext cx="5486400" cy="4114800"/>
+          </a:xfrm>
+          <a:prstGeom prst="rect">
+            <a:avLst/>
+          </a:prstGeom>
+          <a:noFill/>
+          <a:ln>
+            <a:noFill/>
+          </a:ln>
+        </p:spPr>
+        <p:txBody>
+          <a:bodyPr spcFirstLastPara="1" wrap="square" lIns="91425" tIns="91425" rIns="91425" bIns="91425" anchor="t" anchorCtr="0">
+            <a:noAutofit/>
+          </a:bodyPr>
+          <a:lstStyle/>
+          <a:p>
+            <a:pPr marL="0" lvl="0" indent="0" algn="l" rtl="0">
+              <a:lnSpc>
+                <a:spcPct val="100000"/>
+              </a:lnSpc>
+              <a:spcBef>
+                <a:spcPts val="0"/>
+              </a:spcBef>
+              <a:spcAft>
+                <a:spcPts val="0"/>
+              </a:spcAft>
+              <a:buSzPts val="1100"/>
+              <a:buNone/>
+            </a:pPr>
+            <a:endParaRPr dirty="0"/>
+          </a:p>
+        </p:txBody>
+      </p:sp>
+    </p:spTree>
+  </p:cSld>
+  <p:clrMapOvr>
+    <a:masterClrMapping/>
+  </p:clrMapOvr>
+</p:notes>
+</file>
+
+<file path=ppt/notesSlides/notesSlide3.xml><?xml version="1.0" encoding="utf-8"?>
+<p:notes xmlns:a="http://schemas.openxmlformats.org/drawingml/2006/main" xmlns:r="http://schemas.openxmlformats.org/officeDocument/2006/relationships" xmlns:p="http://schemas.openxmlformats.org/presentationml/2006/main" showMasterSp="0" showMasterPhAnim="0">
+  <p:cSld>
+    <p:spTree>
+      <p:nvGrpSpPr>
         <p:cNvPr id="1" name="Shape 331"/>
         <p:cNvGrpSpPr/>
         <p:nvPr/>
@@ -1495,115 +1507,6 @@
         </p:txBody>
       </p:sp>
     </p:spTree>
-  </p:cSld>
-  <p:clrMapOvr>
-    <a:masterClrMapping/>
-  </p:clrMapOvr>
-</p:notes>
-</file>
-
-<file path=ppt/notesSlides/notesSlide3.xml><?xml version="1.0" encoding="utf-8"?>
-<p:notes xmlns:a="http://schemas.openxmlformats.org/drawingml/2006/main" xmlns:r="http://schemas.openxmlformats.org/officeDocument/2006/relationships" xmlns:p="http://schemas.openxmlformats.org/presentationml/2006/main" showMasterSp="0" showMasterPhAnim="0">
-  <p:cSld>
-    <p:spTree>
-      <p:nvGrpSpPr>
-        <p:cNvPr id="1" name="Shape 477"/>
-        <p:cNvGrpSpPr/>
-        <p:nvPr/>
-      </p:nvGrpSpPr>
-      <p:grpSpPr>
-        <a:xfrm>
-          <a:off x="0" y="0"/>
-          <a:ext cx="0" cy="0"/>
-          <a:chOff x="0" y="0"/>
-          <a:chExt cx="0" cy="0"/>
-        </a:xfrm>
-      </p:grpSpPr>
-      <p:sp>
-        <p:nvSpPr>
-          <p:cNvPr id="478" name="Google Shape;478;g155dbe401f8_0_909:notes"/>
-          <p:cNvSpPr>
-            <a:spLocks noGrp="1" noRot="1" noChangeAspect="1"/>
-          </p:cNvSpPr>
-          <p:nvPr>
-            <p:ph type="sldImg" idx="2"/>
-          </p:nvPr>
-        </p:nvSpPr>
-        <p:spPr>
-          <a:xfrm>
-            <a:off x="1143000" y="685800"/>
-            <a:ext cx="4572000" cy="3429000"/>
-          </a:xfrm>
-          <a:custGeom>
-            <a:avLst/>
-            <a:gdLst/>
-            <a:ahLst/>
-            <a:cxnLst/>
-            <a:rect l="l" t="t" r="r" b="b"/>
-            <a:pathLst>
-              <a:path w="120000" h="120000" extrusionOk="0">
-                <a:moveTo>
-                  <a:pt x="0" y="0"/>
-                </a:moveTo>
-                <a:lnTo>
-                  <a:pt x="120000" y="0"/>
-                </a:lnTo>
-                <a:lnTo>
-                  <a:pt x="120000" y="120000"/>
-                </a:lnTo>
-                <a:lnTo>
-                  <a:pt x="0" y="120000"/>
-                </a:lnTo>
-                <a:close/>
-              </a:path>
-            </a:pathLst>
-          </a:custGeom>
-        </p:spPr>
-      </p:sp>
-      <p:sp>
-        <p:nvSpPr>
-          <p:cNvPr id="479" name="Google Shape;479;g155dbe401f8_0_909:notes"/>
-          <p:cNvSpPr txBox="1">
-            <a:spLocks noGrp="1"/>
-          </p:cNvSpPr>
-          <p:nvPr>
-            <p:ph type="body" idx="1"/>
-          </p:nvPr>
-        </p:nvSpPr>
-        <p:spPr>
-          <a:xfrm>
-            <a:off x="685800" y="4343400"/>
-            <a:ext cx="5486400" cy="4114800"/>
-          </a:xfrm>
-          <a:prstGeom prst="rect">
-            <a:avLst/>
-          </a:prstGeom>
-        </p:spPr>
-        <p:txBody>
-          <a:bodyPr spcFirstLastPara="1" wrap="square" lIns="91425" tIns="91425" rIns="91425" bIns="91425" anchor="t" anchorCtr="0">
-            <a:noAutofit/>
-          </a:bodyPr>
-          <a:lstStyle/>
-          <a:p>
-            <a:pPr marL="0" lvl="0" indent="0" algn="l" rtl="0">
-              <a:spcBef>
-                <a:spcPts val="0"/>
-              </a:spcBef>
-              <a:spcAft>
-                <a:spcPts val="0"/>
-              </a:spcAft>
-              <a:buNone/>
-            </a:pPr>
-            <a:endParaRPr/>
-          </a:p>
-        </p:txBody>
-      </p:sp>
-    </p:spTree>
-    <p:extLst>
-      <p:ext uri="{BB962C8B-B14F-4D97-AF65-F5344CB8AC3E}">
-        <p14:creationId xmlns:p14="http://schemas.microsoft.com/office/powerpoint/2010/main" val="2143849999"/>
-      </p:ext>
-    </p:extLst>
   </p:cSld>
   <p:clrMapOvr>
     <a:masterClrMapping/>
@@ -2445,7 +2348,7 @@
             <a:fld id="{1D8BD707-D9CF-40AE-B4C6-C98DA3205C09}" type="datetimeFigureOut">
               <a:rPr lang="en-US" smtClean="0"/>
               <a:pPr/>
-              <a:t>3/28/2024</a:t>
+              <a:t>3/29/2024</a:t>
             </a:fld>
             <a:endParaRPr lang="en-US"/>
           </a:p>
@@ -2610,7 +2513,7 @@
             <a:fld id="{1D8BD707-D9CF-40AE-B4C6-C98DA3205C09}" type="datetimeFigureOut">
               <a:rPr lang="en-US" smtClean="0"/>
               <a:pPr/>
-              <a:t>3/28/2024</a:t>
+              <a:t>3/29/2024</a:t>
             </a:fld>
             <a:endParaRPr lang="en-US"/>
           </a:p>
@@ -2785,7 +2688,7 @@
             <a:fld id="{1D8BD707-D9CF-40AE-B4C6-C98DA3205C09}" type="datetimeFigureOut">
               <a:rPr lang="en-US" smtClean="0"/>
               <a:pPr/>
-              <a:t>3/28/2024</a:t>
+              <a:t>3/29/2024</a:t>
             </a:fld>
             <a:endParaRPr lang="en-US"/>
           </a:p>
@@ -8863,7 +8766,7 @@
                 <a:hlinkClick r:id="rId2">
                   <a:extLst>
                     <a:ext uri="{A12FA001-AC4F-418D-AE19-62706E023703}">
-                      <ahyp:hlinkClr xmlns:ahyp="http://schemas.microsoft.com/office/drawing/2018/hyperlinkcolor" xmlns="" val="tx"/>
+                      <ahyp:hlinkClr xmlns="" xmlns:ahyp="http://schemas.microsoft.com/office/drawing/2018/hyperlinkcolor" val="tx"/>
                     </a:ext>
                   </a:extLst>
                 </a:hlinkClick>
@@ -8897,7 +8800,7 @@
                 <a:hlinkClick r:id="rId3">
                   <a:extLst>
                     <a:ext uri="{A12FA001-AC4F-418D-AE19-62706E023703}">
-                      <ahyp:hlinkClr xmlns:ahyp="http://schemas.microsoft.com/office/drawing/2018/hyperlinkcolor" xmlns="" val="tx"/>
+                      <ahyp:hlinkClr xmlns="" xmlns:ahyp="http://schemas.microsoft.com/office/drawing/2018/hyperlinkcolor" val="tx"/>
                     </a:ext>
                   </a:extLst>
                 </a:hlinkClick>
@@ -8931,7 +8834,7 @@
                 <a:hlinkClick r:id="rId4">
                   <a:extLst>
                     <a:ext uri="{A12FA001-AC4F-418D-AE19-62706E023703}">
-                      <ahyp:hlinkClr xmlns:ahyp="http://schemas.microsoft.com/office/drawing/2018/hyperlinkcolor" xmlns="" val="tx"/>
+                      <ahyp:hlinkClr xmlns="" xmlns:ahyp="http://schemas.microsoft.com/office/drawing/2018/hyperlinkcolor" val="tx"/>
                     </a:ext>
                   </a:extLst>
                 </a:hlinkClick>
@@ -9083,7 +8986,7 @@
             <a:fld id="{1D8BD707-D9CF-40AE-B4C6-C98DA3205C09}" type="datetimeFigureOut">
               <a:rPr lang="en-US" smtClean="0"/>
               <a:pPr/>
-              <a:t>3/28/2024</a:t>
+              <a:t>3/29/2024</a:t>
             </a:fld>
             <a:endParaRPr lang="en-US"/>
           </a:p>
@@ -9325,7 +9228,7 @@
             <a:fld id="{1D8BD707-D9CF-40AE-B4C6-C98DA3205C09}" type="datetimeFigureOut">
               <a:rPr lang="en-US" smtClean="0"/>
               <a:pPr/>
-              <a:t>3/28/2024</a:t>
+              <a:t>3/29/2024</a:t>
             </a:fld>
             <a:endParaRPr lang="en-US"/>
           </a:p>
@@ -9607,7 +9510,7 @@
             <a:fld id="{1D8BD707-D9CF-40AE-B4C6-C98DA3205C09}" type="datetimeFigureOut">
               <a:rPr lang="en-US" smtClean="0"/>
               <a:pPr/>
-              <a:t>3/28/2024</a:t>
+              <a:t>3/29/2024</a:t>
             </a:fld>
             <a:endParaRPr lang="en-US"/>
           </a:p>
@@ -10023,7 +9926,7 @@
             <a:fld id="{1D8BD707-D9CF-40AE-B4C6-C98DA3205C09}" type="datetimeFigureOut">
               <a:rPr lang="en-US" smtClean="0"/>
               <a:pPr/>
-              <a:t>3/28/2024</a:t>
+              <a:t>3/29/2024</a:t>
             </a:fld>
             <a:endParaRPr lang="en-US"/>
           </a:p>
@@ -10137,7 +10040,7 @@
             <a:fld id="{1D8BD707-D9CF-40AE-B4C6-C98DA3205C09}" type="datetimeFigureOut">
               <a:rPr lang="en-US" smtClean="0"/>
               <a:pPr/>
-              <a:t>3/28/2024</a:t>
+              <a:t>3/29/2024</a:t>
             </a:fld>
             <a:endParaRPr lang="en-US"/>
           </a:p>
@@ -10229,7 +10132,7 @@
             <a:fld id="{1D8BD707-D9CF-40AE-B4C6-C98DA3205C09}" type="datetimeFigureOut">
               <a:rPr lang="en-US" smtClean="0"/>
               <a:pPr/>
-              <a:t>3/28/2024</a:t>
+              <a:t>3/29/2024</a:t>
             </a:fld>
             <a:endParaRPr lang="en-US"/>
           </a:p>
@@ -10501,7 +10404,7 @@
             <a:fld id="{1D8BD707-D9CF-40AE-B4C6-C98DA3205C09}" type="datetimeFigureOut">
               <a:rPr lang="en-US" smtClean="0"/>
               <a:pPr/>
-              <a:t>3/28/2024</a:t>
+              <a:t>3/29/2024</a:t>
             </a:fld>
             <a:endParaRPr lang="en-US"/>
           </a:p>
@@ -10750,7 +10653,7 @@
             <a:fld id="{1D8BD707-D9CF-40AE-B4C6-C98DA3205C09}" type="datetimeFigureOut">
               <a:rPr lang="en-US" smtClean="0"/>
               <a:pPr/>
-              <a:t>3/28/2024</a:t>
+              <a:t>3/29/2024</a:t>
             </a:fld>
             <a:endParaRPr lang="en-US"/>
           </a:p>
@@ -10958,7 +10861,7 @@
             <a:fld id="{1D8BD707-D9CF-40AE-B4C6-C98DA3205C09}" type="datetimeFigureOut">
               <a:rPr lang="en-US" smtClean="0"/>
               <a:pPr/>
-              <a:t>3/28/2024</a:t>
+              <a:t>3/29/2024</a:t>
             </a:fld>
             <a:endParaRPr lang="en-US"/>
           </a:p>
@@ -11348,6 +11251,12 @@
             <a:chOff x="824525" y="3369250"/>
             <a:chExt cx="3935100" cy="807000"/>
           </a:xfrm>
+          <a:solidFill>
+            <a:schemeClr val="accent1">
+              <a:lumMod val="60000"/>
+              <a:lumOff val="40000"/>
+            </a:schemeClr>
+          </a:solidFill>
         </p:grpSpPr>
         <p:sp>
           <p:nvSpPr>
@@ -11365,9 +11274,7 @@
                 <a:gd name="adj" fmla="val 50000"/>
               </a:avLst>
             </a:prstGeom>
-            <a:solidFill>
-              <a:schemeClr val="accent3"/>
-            </a:solidFill>
+            <a:grpFill/>
             <a:ln>
               <a:noFill/>
             </a:ln>
@@ -11423,7 +11330,7 @@
                 <a:gd name="adj" fmla="val 50000"/>
               </a:avLst>
             </a:prstGeom>
-            <a:noFill/>
+            <a:grpFill/>
             <a:ln w="19050" cap="flat" cmpd="sng">
               <a:solidFill>
                 <a:schemeClr val="accent1"/>
@@ -12068,108 +11975,6 @@
 </file>
 
 <file path=ppt/slides/slide10.xml><?xml version="1.0" encoding="utf-8"?>
-<p:sld xmlns:a="http://schemas.openxmlformats.org/drawingml/2006/main" xmlns:r="http://schemas.openxmlformats.org/officeDocument/2006/relationships" xmlns:p="http://schemas.openxmlformats.org/presentationml/2006/main">
-  <p:cSld>
-    <p:spTree>
-      <p:nvGrpSpPr>
-        <p:cNvPr id="1" name=""/>
-        <p:cNvGrpSpPr/>
-        <p:nvPr/>
-      </p:nvGrpSpPr>
-      <p:grpSpPr>
-        <a:xfrm>
-          <a:off x="0" y="0"/>
-          <a:ext cx="0" cy="0"/>
-          <a:chOff x="0" y="0"/>
-          <a:chExt cx="0" cy="0"/>
-        </a:xfrm>
-      </p:grpSpPr>
-      <p:pic>
-        <p:nvPicPr>
-          <p:cNvPr id="4" name="Picture 3"/>
-          <p:cNvPicPr>
-            <a:picLocks noChangeAspect="1"/>
-          </p:cNvPicPr>
-          <p:nvPr/>
-        </p:nvPicPr>
-        <p:blipFill>
-          <a:blip r:embed="rId2">
-            <a:extLst>
-              <a:ext uri="{28A0092B-C50C-407E-A947-70E740481C1C}">
-                <a14:useLocalDpi xmlns:a14="http://schemas.microsoft.com/office/drawing/2010/main" val="0"/>
-              </a:ext>
-            </a:extLst>
-          </a:blip>
-          <a:stretch>
-            <a:fillRect/>
-          </a:stretch>
-        </p:blipFill>
-        <p:spPr>
-          <a:xfrm>
-            <a:off x="457200" y="304800"/>
-            <a:ext cx="8275013" cy="5789585"/>
-          </a:xfrm>
-          <a:prstGeom prst="rect">
-            <a:avLst/>
-          </a:prstGeom>
-        </p:spPr>
-      </p:pic>
-      <p:sp>
-        <p:nvSpPr>
-          <p:cNvPr id="6" name="TextBox 5"/>
-          <p:cNvSpPr txBox="1"/>
-          <p:nvPr/>
-        </p:nvSpPr>
-        <p:spPr>
-          <a:xfrm>
-            <a:off x="1652828" y="6231128"/>
-            <a:ext cx="5883756" cy="338554"/>
-          </a:xfrm>
-          <a:prstGeom prst="rect">
-            <a:avLst/>
-          </a:prstGeom>
-          <a:noFill/>
-        </p:spPr>
-        <p:txBody>
-          <a:bodyPr wrap="square" rtlCol="0">
-            <a:spAutoFit/>
-          </a:bodyPr>
-          <a:lstStyle/>
-          <a:p>
-            <a:pPr algn="ctr"/>
-            <a:r>
-              <a:rPr lang="en-GB" sz="1600" b="1" dirty="0" smtClean="0"/>
-              <a:t>Figure 3 : General </a:t>
-            </a:r>
-            <a:r>
-              <a:rPr lang="en-GB" sz="1600" b="1" dirty="0" smtClean="0"/>
-              <a:t>structure and components logic implementation</a:t>
-            </a:r>
-            <a:endParaRPr lang="en-GB" sz="1600" b="1" dirty="0"/>
-          </a:p>
-        </p:txBody>
-      </p:sp>
-    </p:spTree>
-    <p:extLst>
-      <p:ext uri="{BB962C8B-B14F-4D97-AF65-F5344CB8AC3E}">
-        <p14:creationId xmlns:p14="http://schemas.microsoft.com/office/powerpoint/2010/main" val="595162780"/>
-      </p:ext>
-    </p:extLst>
-  </p:cSld>
-  <p:clrMapOvr>
-    <a:masterClrMapping/>
-  </p:clrMapOvr>
-  <p:timing>
-    <p:tnLst>
-      <p:par>
-        <p:cTn id="1" dur="indefinite" restart="never" nodeType="tmRoot"/>
-      </p:par>
-    </p:tnLst>
-  </p:timing>
-</p:sld>
-</file>
-
-<file path=ppt/slides/slide11.xml><?xml version="1.0" encoding="utf-8"?>
 <p:sld xmlns:a="http://schemas.openxmlformats.org/drawingml/2006/main" xmlns:r="http://schemas.openxmlformats.org/officeDocument/2006/relationships" xmlns:p="http://schemas.openxmlformats.org/presentationml/2006/main">
   <p:cSld>
     <p:spTree>
@@ -13911,7 +13716,7 @@
 </p:sld>
 </file>
 
-<file path=ppt/slides/slide12.xml><?xml version="1.0" encoding="utf-8"?>
+<file path=ppt/slides/slide11.xml><?xml version="1.0" encoding="utf-8"?>
 <p:sld xmlns:a="http://schemas.openxmlformats.org/drawingml/2006/main" xmlns:r="http://schemas.openxmlformats.org/officeDocument/2006/relationships" xmlns:p="http://schemas.openxmlformats.org/presentationml/2006/main">
   <p:cSld>
     <p:spTree>
@@ -14323,7 +14128,7 @@
 </p:sld>
 </file>
 
-<file path=ppt/slides/slide13.xml><?xml version="1.0" encoding="utf-8"?>
+<file path=ppt/slides/slide12.xml><?xml version="1.0" encoding="utf-8"?>
 <p:sld xmlns:a="http://schemas.openxmlformats.org/drawingml/2006/main" xmlns:r="http://schemas.openxmlformats.org/officeDocument/2006/relationships" xmlns:p="http://schemas.openxmlformats.org/presentationml/2006/main">
   <p:cSld>
     <p:spTree>
@@ -14681,7 +14486,7 @@
         <p:spPr>
           <a:xfrm>
             <a:off x="508000" y="2057400"/>
-            <a:ext cx="4572000" cy="3416320"/>
+            <a:ext cx="4572000" cy="3970318"/>
           </a:xfrm>
           <a:prstGeom prst="rect">
             <a:avLst/>
@@ -14714,11 +14519,53 @@
             <a:pPr lvl="1"/>
             <a:r>
               <a:rPr lang="en-GB" i="1" dirty="0" smtClean="0"/>
-              <a:t>1021,1234,1542,1540,3333,1000 </a:t>
+              <a:t>1021,1234,1542,1540,3333,1000</a:t>
+            </a:r>
+          </a:p>
+          <a:p>
+            <a:pPr lvl="1"/>
+            <a:r>
+              <a:rPr lang="en-GB" i="1" dirty="0" smtClean="0"/>
+              <a:t>1214,5454,3454,2180,218 </a:t>
+            </a:r>
+          </a:p>
+          <a:p>
+            <a:pPr lvl="1"/>
+            <a:r>
+              <a:rPr lang="en-GB" i="1" dirty="0" smtClean="0"/>
+              <a:t>123</a:t>
             </a:r>
             <a:r>
               <a:rPr lang="en-GB" i="1" dirty="0"/>
-              <a:t>1214,5454,3454,2180,218 123, 124, 145, 156, 189, 656 5646, 9796, 478, 6786, 5250 464, 4646,4546,4455,778 1111,2222,3333,4444 5555,6666,7777,8888,9999 1234,5678,9123 10,8202,9025,2024,3058 </a:t>
+              <a:t>, 124, </a:t>
+            </a:r>
+            <a:r>
+              <a:rPr lang="en-GB" i="1" dirty="0" smtClean="0"/>
+              <a:t>145,156</a:t>
+            </a:r>
+            <a:r>
+              <a:rPr lang="en-GB" i="1" dirty="0"/>
+              <a:t>, 189, 656 5646, 9796, 478, 6786, 5250 </a:t>
+            </a:r>
+            <a:endParaRPr lang="en-GB" i="1" dirty="0" smtClean="0"/>
+          </a:p>
+          <a:p>
+            <a:pPr lvl="1"/>
+            <a:r>
+              <a:rPr lang="en-GB" i="1" dirty="0" smtClean="0"/>
+              <a:t>464</a:t>
+            </a:r>
+            <a:r>
+              <a:rPr lang="en-GB" i="1" dirty="0"/>
+              <a:t>, 4646,4546,4455,778 1111,2222,3333,4444 5555,6666,7777,8888,9999 1234,5678,9123 </a:t>
+            </a:r>
+            <a:endParaRPr lang="en-GB" i="1" dirty="0" smtClean="0"/>
+          </a:p>
+          <a:p>
+            <a:pPr lvl="1"/>
+            <a:r>
+              <a:rPr lang="en-GB" i="1" dirty="0" smtClean="0"/>
+              <a:t>10,8202,9025,2024,3058 </a:t>
             </a:r>
             <a:endParaRPr lang="en-GB" i="1" dirty="0" smtClean="0"/>
           </a:p>
@@ -14759,7 +14606,7 @@
 </p:sld>
 </file>
 
-<file path=ppt/slides/slide14.xml><?xml version="1.0" encoding="utf-8"?>
+<file path=ppt/slides/slide13.xml><?xml version="1.0" encoding="utf-8"?>
 <p:sld xmlns:a="http://schemas.openxmlformats.org/drawingml/2006/main" xmlns:r="http://schemas.openxmlformats.org/officeDocument/2006/relationships" xmlns:p="http://schemas.openxmlformats.org/presentationml/2006/main">
   <p:cSld>
     <p:spTree>
@@ -15222,7 +15069,7 @@
 </p:sld>
 </file>
 
-<file path=ppt/slides/slide15.xml><?xml version="1.0" encoding="utf-8"?>
+<file path=ppt/slides/slide14.xml><?xml version="1.0" encoding="utf-8"?>
 <p:sld xmlns:a="http://schemas.openxmlformats.org/drawingml/2006/main" xmlns:r="http://schemas.openxmlformats.org/officeDocument/2006/relationships" xmlns:p="http://schemas.openxmlformats.org/presentationml/2006/main">
   <p:cSld>
     <p:spTree>
@@ -15804,7 +15651,7 @@
 </p:sld>
 </file>
 
-<file path=ppt/slides/slide16.xml><?xml version="1.0" encoding="utf-8"?>
+<file path=ppt/slides/slide15.xml><?xml version="1.0" encoding="utf-8"?>
 <p:sld xmlns:a="http://schemas.openxmlformats.org/drawingml/2006/main" xmlns:r="http://schemas.openxmlformats.org/officeDocument/2006/relationships" xmlns:p="http://schemas.openxmlformats.org/presentationml/2006/main">
   <p:cSld>
     <p:spTree>
@@ -16040,11 +15887,7 @@
             </a:r>
             <a:r>
               <a:rPr lang="en-GB" sz="1400" dirty="0" smtClean="0"/>
-              <a:t>, 2021</a:t>
-            </a:r>
-            <a:r>
-              <a:rPr lang="en-GB" sz="1400" dirty="0" smtClean="0"/>
-              <a:t>. Accessed on: </a:t>
+              <a:t>, 2021. Accessed on: </a:t>
             </a:r>
             <a:r>
               <a:rPr lang="en-GB" sz="1400" dirty="0" smtClean="0">
@@ -16056,7 +15899,6 @@
               <a:rPr lang="en-GB" sz="1400" dirty="0" smtClean="0"/>
               <a:t> . </a:t>
             </a:r>
-            <a:endParaRPr lang="en-GB" sz="1400" dirty="0" smtClean="0"/>
           </a:p>
         </p:txBody>
       </p:sp>
@@ -16080,7 +15922,7 @@
 </p:sld>
 </file>
 
-<file path=ppt/slides/slide17.xml><?xml version="1.0" encoding="utf-8"?>
+<file path=ppt/slides/slide16.xml><?xml version="1.0" encoding="utf-8"?>
 <p:sld xmlns:a="http://schemas.openxmlformats.org/drawingml/2006/main" xmlns:r="http://schemas.openxmlformats.org/officeDocument/2006/relationships" xmlns:p="http://schemas.openxmlformats.org/presentationml/2006/main">
   <p:cSld>
     <p:spTree>
@@ -16225,6 +16067,1403 @@
 </file>
 
 <file path=ppt/slides/slide2.xml><?xml version="1.0" encoding="utf-8"?>
+<p:sld xmlns:a="http://schemas.openxmlformats.org/drawingml/2006/main" xmlns:r="http://schemas.openxmlformats.org/officeDocument/2006/relationships" xmlns:p="http://schemas.openxmlformats.org/presentationml/2006/main">
+  <p:cSld>
+    <p:spTree>
+      <p:nvGrpSpPr>
+        <p:cNvPr id="1" name="Shape 160"/>
+        <p:cNvGrpSpPr/>
+        <p:nvPr/>
+      </p:nvGrpSpPr>
+      <p:grpSpPr>
+        <a:xfrm>
+          <a:off x="0" y="0"/>
+          <a:ext cx="0" cy="0"/>
+          <a:chOff x="0" y="0"/>
+          <a:chExt cx="0" cy="0"/>
+        </a:xfrm>
+      </p:grpSpPr>
+      <p:grpSp>
+        <p:nvGrpSpPr>
+          <p:cNvPr id="161" name="Google Shape;161;p2"/>
+          <p:cNvGrpSpPr/>
+          <p:nvPr/>
+        </p:nvGrpSpPr>
+        <p:grpSpPr>
+          <a:xfrm>
+            <a:off x="808344" y="1631655"/>
+            <a:ext cx="3720637" cy="1022006"/>
+            <a:chOff x="824525" y="2880502"/>
+            <a:chExt cx="3935100" cy="1295646"/>
+          </a:xfrm>
+        </p:grpSpPr>
+        <p:sp>
+          <p:nvSpPr>
+            <p:cNvPr id="162" name="Google Shape;162;p2"/>
+            <p:cNvSpPr/>
+            <p:nvPr/>
+          </p:nvSpPr>
+          <p:spPr>
+            <a:xfrm>
+              <a:off x="900725" y="3002849"/>
+              <a:ext cx="3858900" cy="1173299"/>
+            </a:xfrm>
+            <a:prstGeom prst="roundRect">
+              <a:avLst>
+                <a:gd name="adj" fmla="val 50000"/>
+              </a:avLst>
+            </a:prstGeom>
+            <a:solidFill>
+              <a:schemeClr val="accent1">
+                <a:lumMod val="60000"/>
+                <a:lumOff val="40000"/>
+              </a:schemeClr>
+            </a:solidFill>
+            <a:ln>
+              <a:solidFill>
+                <a:schemeClr val="accent1"/>
+              </a:solidFill>
+            </a:ln>
+          </p:spPr>
+          <p:txBody>
+            <a:bodyPr spcFirstLastPara="1" wrap="square" lIns="91425" tIns="91425" rIns="91425" bIns="91425" anchor="ctr" anchorCtr="0">
+              <a:noAutofit/>
+            </a:bodyPr>
+            <a:lstStyle/>
+            <a:p>
+              <a:pPr marL="0" marR="0" lvl="0" indent="0" algn="l" rtl="0">
+                <a:lnSpc>
+                  <a:spcPct val="100000"/>
+                </a:lnSpc>
+                <a:spcBef>
+                  <a:spcPts val="0"/>
+                </a:spcBef>
+                <a:spcAft>
+                  <a:spcPts val="0"/>
+                </a:spcAft>
+                <a:buClr>
+                  <a:srgbClr val="000000"/>
+                </a:buClr>
+                <a:buSzPts val="1400"/>
+                <a:buFont typeface="Arial"/>
+                <a:buNone/>
+              </a:pPr>
+              <a:r>
+                <a:rPr lang="en-GB" sz="2400" i="0" u="none" strike="noStrike" cap="none" dirty="0">
+                  <a:solidFill>
+                    <a:srgbClr val="000000"/>
+                  </a:solidFill>
+                  <a:ea typeface="Times New Roman"/>
+                  <a:cs typeface="Times New Roman"/>
+                  <a:sym typeface="Times New Roman"/>
+                </a:rPr>
+                <a:t>Introduction</a:t>
+              </a:r>
+              <a:endParaRPr sz="2400" i="0" u="none" strike="noStrike" cap="none" dirty="0">
+                <a:solidFill>
+                  <a:srgbClr val="000000"/>
+                </a:solidFill>
+                <a:ea typeface="Times New Roman"/>
+                <a:cs typeface="Times New Roman"/>
+                <a:sym typeface="Times New Roman"/>
+              </a:endParaRPr>
+            </a:p>
+          </p:txBody>
+        </p:sp>
+        <p:sp>
+          <p:nvSpPr>
+            <p:cNvPr id="163" name="Google Shape;163;p2"/>
+            <p:cNvSpPr/>
+            <p:nvPr/>
+          </p:nvSpPr>
+          <p:spPr>
+            <a:xfrm>
+              <a:off x="824525" y="2880500"/>
+              <a:ext cx="3858900" cy="1173300"/>
+            </a:xfrm>
+            <a:prstGeom prst="roundRect">
+              <a:avLst>
+                <a:gd name="adj" fmla="val 50000"/>
+              </a:avLst>
+            </a:prstGeom>
+            <a:noFill/>
+            <a:ln w="19050" cap="flat" cmpd="sng">
+              <a:solidFill>
+                <a:schemeClr val="accent1"/>
+              </a:solidFill>
+              <a:prstDash val="solid"/>
+              <a:round/>
+              <a:headEnd type="none" w="sm" len="sm"/>
+              <a:tailEnd type="none" w="sm" len="sm"/>
+            </a:ln>
+          </p:spPr>
+          <p:txBody>
+            <a:bodyPr spcFirstLastPara="1" wrap="square" lIns="91425" tIns="91425" rIns="91425" bIns="91425" anchor="ctr" anchorCtr="0">
+              <a:noAutofit/>
+            </a:bodyPr>
+            <a:lstStyle/>
+            <a:p>
+              <a:pPr marL="0" marR="0" lvl="0" indent="0" algn="l" rtl="0">
+                <a:lnSpc>
+                  <a:spcPct val="100000"/>
+                </a:lnSpc>
+                <a:spcBef>
+                  <a:spcPts val="0"/>
+                </a:spcBef>
+                <a:spcAft>
+                  <a:spcPts val="0"/>
+                </a:spcAft>
+                <a:buClr>
+                  <a:srgbClr val="000000"/>
+                </a:buClr>
+                <a:buSzPts val="1400"/>
+                <a:buFont typeface="Arial"/>
+                <a:buNone/>
+              </a:pPr>
+              <a:endParaRPr sz="1400" i="0" u="none" strike="noStrike" cap="none">
+                <a:solidFill>
+                  <a:srgbClr val="000000"/>
+                </a:solidFill>
+                <a:ea typeface="Times New Roman"/>
+                <a:cs typeface="Times New Roman"/>
+                <a:sym typeface="Times New Roman"/>
+              </a:endParaRPr>
+            </a:p>
+          </p:txBody>
+        </p:sp>
+      </p:grpSp>
+      <p:sp>
+        <p:nvSpPr>
+          <p:cNvPr id="165" name="Google Shape;165;p2"/>
+          <p:cNvSpPr txBox="1">
+            <a:spLocks noGrp="1"/>
+          </p:cNvSpPr>
+          <p:nvPr>
+            <p:ph type="title"/>
+          </p:nvPr>
+        </p:nvSpPr>
+        <p:spPr>
+          <a:xfrm>
+            <a:off x="2286000" y="157933"/>
+            <a:ext cx="4932300" cy="870800"/>
+          </a:xfrm>
+          <a:prstGeom prst="rect">
+            <a:avLst/>
+          </a:prstGeom>
+          <a:noFill/>
+          <a:ln>
+            <a:noFill/>
+          </a:ln>
+        </p:spPr>
+        <p:txBody>
+          <a:bodyPr spcFirstLastPara="1" wrap="square" lIns="91425" tIns="91425" rIns="91425" bIns="91425" anchor="ctr" anchorCtr="0">
+            <a:noAutofit/>
+          </a:bodyPr>
+          <a:lstStyle/>
+          <a:p>
+            <a:pPr marL="0" lvl="0" indent="0" algn="ctr" rtl="0">
+              <a:lnSpc>
+                <a:spcPct val="100000"/>
+              </a:lnSpc>
+              <a:spcBef>
+                <a:spcPts val="0"/>
+              </a:spcBef>
+              <a:spcAft>
+                <a:spcPts val="0"/>
+              </a:spcAft>
+              <a:buSzPts val="3000"/>
+              <a:buNone/>
+            </a:pPr>
+            <a:r>
+              <a:rPr lang="en" sz="3400" b="1" dirty="0">
+                <a:solidFill>
+                  <a:schemeClr val="tx1">
+                    <a:lumMod val="50000"/>
+                  </a:schemeClr>
+                </a:solidFill>
+                <a:ea typeface="Times New Roman"/>
+                <a:cs typeface="Times New Roman"/>
+                <a:sym typeface="Times New Roman"/>
+              </a:rPr>
+              <a:t>Presentation parts</a:t>
+            </a:r>
+            <a:endParaRPr sz="3400" b="1" dirty="0">
+              <a:solidFill>
+                <a:schemeClr val="tx1">
+                  <a:lumMod val="50000"/>
+                </a:schemeClr>
+              </a:solidFill>
+              <a:ea typeface="Times New Roman"/>
+              <a:cs typeface="Times New Roman"/>
+              <a:sym typeface="Times New Roman"/>
+            </a:endParaRPr>
+          </a:p>
+        </p:txBody>
+      </p:sp>
+      <p:sp>
+        <p:nvSpPr>
+          <p:cNvPr id="164" name="Google Shape;164;p2"/>
+          <p:cNvSpPr txBox="1">
+            <a:spLocks noGrp="1"/>
+          </p:cNvSpPr>
+          <p:nvPr>
+            <p:ph type="subTitle" idx="1"/>
+          </p:nvPr>
+        </p:nvSpPr>
+        <p:spPr>
+          <a:xfrm>
+            <a:off x="1287900" y="5608772"/>
+            <a:ext cx="2761500" cy="731600"/>
+          </a:xfrm>
+          <a:prstGeom prst="rect">
+            <a:avLst/>
+          </a:prstGeom>
+          <a:noFill/>
+          <a:ln>
+            <a:noFill/>
+          </a:ln>
+        </p:spPr>
+        <p:txBody>
+          <a:bodyPr spcFirstLastPara="1" wrap="square" lIns="91425" tIns="91425" rIns="91425" bIns="91425" anchor="t" anchorCtr="0">
+            <a:noAutofit/>
+          </a:bodyPr>
+          <a:lstStyle/>
+          <a:p>
+            <a:pPr marL="0" lvl="0" indent="0" algn="l" rtl="0">
+              <a:lnSpc>
+                <a:spcPct val="115000"/>
+              </a:lnSpc>
+              <a:spcBef>
+                <a:spcPts val="0"/>
+              </a:spcBef>
+              <a:spcAft>
+                <a:spcPts val="0"/>
+              </a:spcAft>
+              <a:buClr>
+                <a:schemeClr val="dk1"/>
+              </a:buClr>
+              <a:buSzPts val="1100"/>
+              <a:buFont typeface="Arial"/>
+              <a:buNone/>
+            </a:pPr>
+            <a:endParaRPr>
+              <a:latin typeface="+mn-lt"/>
+              <a:ea typeface="Times New Roman"/>
+              <a:cs typeface="Times New Roman"/>
+              <a:sym typeface="Times New Roman"/>
+            </a:endParaRPr>
+          </a:p>
+          <a:p>
+            <a:pPr marL="0" lvl="0" indent="0" algn="l" rtl="0">
+              <a:lnSpc>
+                <a:spcPct val="100000"/>
+              </a:lnSpc>
+              <a:spcBef>
+                <a:spcPts val="0"/>
+              </a:spcBef>
+              <a:spcAft>
+                <a:spcPts val="0"/>
+              </a:spcAft>
+              <a:buSzPts val="1400"/>
+              <a:buNone/>
+            </a:pPr>
+            <a:endParaRPr>
+              <a:latin typeface="+mn-lt"/>
+              <a:ea typeface="Times New Roman"/>
+              <a:cs typeface="Times New Roman"/>
+              <a:sym typeface="Times New Roman"/>
+            </a:endParaRPr>
+          </a:p>
+        </p:txBody>
+      </p:sp>
+      <p:sp>
+        <p:nvSpPr>
+          <p:cNvPr id="166" name="Google Shape;166;p2"/>
+          <p:cNvSpPr txBox="1">
+            <a:spLocks noGrp="1"/>
+          </p:cNvSpPr>
+          <p:nvPr>
+            <p:ph type="title" idx="2"/>
+          </p:nvPr>
+        </p:nvSpPr>
+        <p:spPr>
+          <a:xfrm>
+            <a:off x="0" y="1671033"/>
+            <a:ext cx="745200" cy="943200"/>
+          </a:xfrm>
+          <a:prstGeom prst="rect">
+            <a:avLst/>
+          </a:prstGeom>
+          <a:noFill/>
+          <a:ln>
+            <a:noFill/>
+          </a:ln>
+        </p:spPr>
+        <p:txBody>
+          <a:bodyPr spcFirstLastPara="1" wrap="square" lIns="91425" tIns="91425" rIns="91425" bIns="91425" anchor="ctr" anchorCtr="0">
+            <a:noAutofit/>
+          </a:bodyPr>
+          <a:lstStyle/>
+          <a:p>
+            <a:pPr marL="0" lvl="0" indent="0" algn="ctr" rtl="0">
+              <a:lnSpc>
+                <a:spcPct val="100000"/>
+              </a:lnSpc>
+              <a:spcBef>
+                <a:spcPts val="0"/>
+              </a:spcBef>
+              <a:spcAft>
+                <a:spcPts val="0"/>
+              </a:spcAft>
+              <a:buSzPts val="4800"/>
+              <a:buNone/>
+            </a:pPr>
+            <a:r>
+              <a:rPr lang="en" sz="3800" dirty="0">
+                <a:latin typeface="+mn-lt"/>
+                <a:ea typeface="Times New Roman"/>
+                <a:cs typeface="Times New Roman"/>
+                <a:sym typeface="Times New Roman"/>
+              </a:rPr>
+              <a:t>01</a:t>
+            </a:r>
+            <a:endParaRPr sz="3800" dirty="0">
+              <a:latin typeface="+mn-lt"/>
+              <a:ea typeface="Times New Roman"/>
+              <a:cs typeface="Times New Roman"/>
+              <a:sym typeface="Times New Roman"/>
+            </a:endParaRPr>
+          </a:p>
+        </p:txBody>
+      </p:sp>
+      <p:sp>
+        <p:nvSpPr>
+          <p:cNvPr id="168" name="Google Shape;168;p2"/>
+          <p:cNvSpPr txBox="1">
+            <a:spLocks noGrp="1"/>
+          </p:cNvSpPr>
+          <p:nvPr>
+            <p:ph type="title" idx="5"/>
+          </p:nvPr>
+        </p:nvSpPr>
+        <p:spPr>
+          <a:xfrm>
+            <a:off x="0" y="4830767"/>
+            <a:ext cx="745200" cy="1022000"/>
+          </a:xfrm>
+          <a:prstGeom prst="rect">
+            <a:avLst/>
+          </a:prstGeom>
+          <a:noFill/>
+          <a:ln>
+            <a:noFill/>
+          </a:ln>
+        </p:spPr>
+        <p:txBody>
+          <a:bodyPr spcFirstLastPara="1" wrap="square" lIns="91425" tIns="91425" rIns="91425" bIns="91425" anchor="ctr" anchorCtr="0">
+            <a:noAutofit/>
+          </a:bodyPr>
+          <a:lstStyle/>
+          <a:p>
+            <a:pPr marL="0" marR="0" lvl="0" indent="0" algn="ctr" rtl="0">
+              <a:lnSpc>
+                <a:spcPct val="100000"/>
+              </a:lnSpc>
+              <a:spcBef>
+                <a:spcPts val="0"/>
+              </a:spcBef>
+              <a:spcAft>
+                <a:spcPts val="0"/>
+              </a:spcAft>
+              <a:buSzPts val="4800"/>
+              <a:buNone/>
+            </a:pPr>
+            <a:r>
+              <a:rPr lang="en" sz="3800">
+                <a:latin typeface="+mn-lt"/>
+                <a:ea typeface="Times New Roman"/>
+                <a:cs typeface="Times New Roman"/>
+                <a:sym typeface="Times New Roman"/>
+              </a:rPr>
+              <a:t>03</a:t>
+            </a:r>
+            <a:endParaRPr>
+              <a:latin typeface="+mn-lt"/>
+              <a:ea typeface="Times New Roman"/>
+              <a:cs typeface="Times New Roman"/>
+              <a:sym typeface="Times New Roman"/>
+            </a:endParaRPr>
+          </a:p>
+        </p:txBody>
+      </p:sp>
+      <p:sp>
+        <p:nvSpPr>
+          <p:cNvPr id="189" name="Google Shape;189;p2"/>
+          <p:cNvSpPr txBox="1">
+            <a:spLocks noGrp="1"/>
+          </p:cNvSpPr>
+          <p:nvPr>
+            <p:ph type="title" idx="6"/>
+          </p:nvPr>
+        </p:nvSpPr>
+        <p:spPr>
+          <a:xfrm>
+            <a:off x="1062900" y="4970117"/>
+            <a:ext cx="3211500" cy="731600"/>
+          </a:xfrm>
+          <a:prstGeom prst="rect">
+            <a:avLst/>
+          </a:prstGeom>
+          <a:noFill/>
+          <a:ln>
+            <a:noFill/>
+          </a:ln>
+        </p:spPr>
+        <p:txBody>
+          <a:bodyPr spcFirstLastPara="1" wrap="square" lIns="91425" tIns="91425" rIns="91425" bIns="91425" anchor="t" anchorCtr="0">
+            <a:noAutofit/>
+          </a:bodyPr>
+          <a:lstStyle/>
+          <a:p>
+            <a:pPr marL="0" lvl="0" indent="0" algn="l" rtl="0">
+              <a:lnSpc>
+                <a:spcPct val="100000"/>
+              </a:lnSpc>
+              <a:spcBef>
+                <a:spcPts val="0"/>
+              </a:spcBef>
+              <a:spcAft>
+                <a:spcPts val="0"/>
+              </a:spcAft>
+              <a:buSzPts val="2800"/>
+              <a:buNone/>
+            </a:pPr>
+            <a:r>
+              <a:rPr lang="en" sz="2500">
+                <a:latin typeface="+mn-lt"/>
+                <a:ea typeface="Times New Roman"/>
+                <a:cs typeface="Times New Roman"/>
+                <a:sym typeface="Times New Roman"/>
+              </a:rPr>
+              <a:t>Mathematical model</a:t>
+            </a:r>
+            <a:endParaRPr>
+              <a:latin typeface="+mn-lt"/>
+              <a:ea typeface="Times New Roman"/>
+              <a:cs typeface="Times New Roman"/>
+              <a:sym typeface="Times New Roman"/>
+            </a:endParaRPr>
+          </a:p>
+        </p:txBody>
+      </p:sp>
+      <p:sp>
+        <p:nvSpPr>
+          <p:cNvPr id="169" name="Google Shape;169;p2"/>
+          <p:cNvSpPr txBox="1">
+            <a:spLocks noGrp="1"/>
+          </p:cNvSpPr>
+          <p:nvPr>
+            <p:ph type="title" idx="8"/>
+          </p:nvPr>
+        </p:nvSpPr>
+        <p:spPr>
+          <a:xfrm>
+            <a:off x="0" y="3211500"/>
+            <a:ext cx="745200" cy="1022000"/>
+          </a:xfrm>
+          <a:prstGeom prst="rect">
+            <a:avLst/>
+          </a:prstGeom>
+          <a:noFill/>
+          <a:ln>
+            <a:noFill/>
+          </a:ln>
+        </p:spPr>
+        <p:txBody>
+          <a:bodyPr spcFirstLastPara="1" wrap="square" lIns="91425" tIns="91425" rIns="91425" bIns="91425" anchor="ctr" anchorCtr="0">
+            <a:noAutofit/>
+          </a:bodyPr>
+          <a:lstStyle/>
+          <a:p>
+            <a:pPr marL="0" marR="0" lvl="0" indent="0" algn="ctr" rtl="0">
+              <a:lnSpc>
+                <a:spcPct val="100000"/>
+              </a:lnSpc>
+              <a:spcBef>
+                <a:spcPts val="0"/>
+              </a:spcBef>
+              <a:spcAft>
+                <a:spcPts val="0"/>
+              </a:spcAft>
+              <a:buSzPts val="4800"/>
+              <a:buNone/>
+            </a:pPr>
+            <a:r>
+              <a:rPr lang="en" sz="3800">
+                <a:latin typeface="+mn-lt"/>
+                <a:ea typeface="Times New Roman"/>
+                <a:cs typeface="Times New Roman"/>
+                <a:sym typeface="Times New Roman"/>
+              </a:rPr>
+              <a:t>02</a:t>
+            </a:r>
+            <a:endParaRPr>
+              <a:latin typeface="+mn-lt"/>
+              <a:ea typeface="Times New Roman"/>
+              <a:cs typeface="Times New Roman"/>
+              <a:sym typeface="Times New Roman"/>
+            </a:endParaRPr>
+          </a:p>
+        </p:txBody>
+      </p:sp>
+      <p:sp>
+        <p:nvSpPr>
+          <p:cNvPr id="188" name="Google Shape;188;p2"/>
+          <p:cNvSpPr txBox="1">
+            <a:spLocks noGrp="1"/>
+          </p:cNvSpPr>
+          <p:nvPr>
+            <p:ph type="title" idx="9"/>
+          </p:nvPr>
+        </p:nvSpPr>
+        <p:spPr>
+          <a:xfrm>
+            <a:off x="908262" y="3244733"/>
+            <a:ext cx="3520800" cy="870800"/>
+          </a:xfrm>
+          <a:prstGeom prst="rect">
+            <a:avLst/>
+          </a:prstGeom>
+          <a:noFill/>
+          <a:ln>
+            <a:noFill/>
+          </a:ln>
+        </p:spPr>
+        <p:txBody>
+          <a:bodyPr spcFirstLastPara="1" wrap="square" lIns="91425" tIns="91425" rIns="91425" bIns="91425" anchor="t" anchorCtr="0">
+            <a:noAutofit/>
+          </a:bodyPr>
+          <a:lstStyle/>
+          <a:p>
+            <a:pPr marL="0" marR="0" lvl="0" indent="0" algn="ctr" rtl="0">
+              <a:lnSpc>
+                <a:spcPct val="100000"/>
+              </a:lnSpc>
+              <a:spcBef>
+                <a:spcPts val="0"/>
+              </a:spcBef>
+              <a:spcAft>
+                <a:spcPts val="0"/>
+              </a:spcAft>
+              <a:buSzPts val="2800"/>
+              <a:buNone/>
+            </a:pPr>
+            <a:r>
+              <a:rPr lang="en" sz="2500" dirty="0">
+                <a:latin typeface="+mn-lt"/>
+                <a:ea typeface="Times New Roman"/>
+                <a:cs typeface="Times New Roman"/>
+                <a:sym typeface="Times New Roman"/>
+              </a:rPr>
+              <a:t>Theoretical Background</a:t>
+            </a:r>
+            <a:endParaRPr sz="2500" dirty="0">
+              <a:latin typeface="+mn-lt"/>
+              <a:ea typeface="Times New Roman"/>
+              <a:cs typeface="Times New Roman"/>
+              <a:sym typeface="Times New Roman"/>
+            </a:endParaRPr>
+          </a:p>
+        </p:txBody>
+      </p:sp>
+      <p:sp>
+        <p:nvSpPr>
+          <p:cNvPr id="187" name="Google Shape;187;p2"/>
+          <p:cNvSpPr txBox="1">
+            <a:spLocks noGrp="1"/>
+          </p:cNvSpPr>
+          <p:nvPr>
+            <p:ph type="title" idx="14"/>
+          </p:nvPr>
+        </p:nvSpPr>
+        <p:spPr>
+          <a:xfrm>
+            <a:off x="4605867" y="3072620"/>
+            <a:ext cx="745200" cy="1022000"/>
+          </a:xfrm>
+          <a:prstGeom prst="rect">
+            <a:avLst/>
+          </a:prstGeom>
+          <a:noFill/>
+          <a:ln>
+            <a:noFill/>
+          </a:ln>
+        </p:spPr>
+        <p:txBody>
+          <a:bodyPr spcFirstLastPara="1" wrap="square" lIns="91425" tIns="91425" rIns="91425" bIns="91425" anchor="ctr" anchorCtr="0">
+            <a:noAutofit/>
+          </a:bodyPr>
+          <a:lstStyle/>
+          <a:p>
+            <a:pPr marL="0" lvl="0" indent="0" algn="ctr" rtl="0">
+              <a:lnSpc>
+                <a:spcPct val="100000"/>
+              </a:lnSpc>
+              <a:spcBef>
+                <a:spcPts val="0"/>
+              </a:spcBef>
+              <a:spcAft>
+                <a:spcPts val="0"/>
+              </a:spcAft>
+              <a:buSzPts val="4800"/>
+              <a:buNone/>
+            </a:pPr>
+            <a:r>
+              <a:rPr lang="en" sz="3800" dirty="0" smtClean="0">
+                <a:latin typeface="+mn-lt"/>
+                <a:ea typeface="Times New Roman"/>
+                <a:cs typeface="Times New Roman"/>
+                <a:sym typeface="Times New Roman"/>
+              </a:rPr>
+              <a:t>05</a:t>
+            </a:r>
+            <a:endParaRPr sz="3800" dirty="0">
+              <a:latin typeface="+mn-lt"/>
+              <a:ea typeface="Times New Roman"/>
+              <a:cs typeface="Times New Roman"/>
+              <a:sym typeface="Times New Roman"/>
+            </a:endParaRPr>
+          </a:p>
+        </p:txBody>
+      </p:sp>
+      <p:sp>
+        <p:nvSpPr>
+          <p:cNvPr id="170" name="Google Shape;170;p2"/>
+          <p:cNvSpPr txBox="1">
+            <a:spLocks noGrp="1"/>
+          </p:cNvSpPr>
+          <p:nvPr>
+            <p:ph type="title" idx="4294967295"/>
+          </p:nvPr>
+        </p:nvSpPr>
+        <p:spPr>
+          <a:xfrm>
+            <a:off x="4643916" y="1602776"/>
+            <a:ext cx="744537" cy="1022350"/>
+          </a:xfrm>
+          <a:prstGeom prst="rect">
+            <a:avLst/>
+          </a:prstGeom>
+          <a:noFill/>
+          <a:ln>
+            <a:noFill/>
+          </a:ln>
+        </p:spPr>
+        <p:txBody>
+          <a:bodyPr spcFirstLastPara="1" wrap="square" lIns="91425" tIns="91425" rIns="91425" bIns="91425" anchor="ctr" anchorCtr="0">
+            <a:noAutofit/>
+          </a:bodyPr>
+          <a:lstStyle/>
+          <a:p>
+            <a:pPr marL="0" lvl="0" indent="0" algn="ctr" rtl="0">
+              <a:lnSpc>
+                <a:spcPct val="100000"/>
+              </a:lnSpc>
+              <a:spcBef>
+                <a:spcPts val="0"/>
+              </a:spcBef>
+              <a:spcAft>
+                <a:spcPts val="0"/>
+              </a:spcAft>
+              <a:buSzPts val="4800"/>
+              <a:buNone/>
+            </a:pPr>
+            <a:r>
+              <a:rPr lang="en" sz="3800" dirty="0">
+                <a:latin typeface="+mn-lt"/>
+                <a:ea typeface="Times New Roman"/>
+                <a:cs typeface="Times New Roman"/>
+                <a:sym typeface="Times New Roman"/>
+              </a:rPr>
+              <a:t>04</a:t>
+            </a:r>
+            <a:endParaRPr sz="3800" dirty="0">
+              <a:latin typeface="+mn-lt"/>
+              <a:ea typeface="Times New Roman"/>
+              <a:cs typeface="Times New Roman"/>
+              <a:sym typeface="Times New Roman"/>
+            </a:endParaRPr>
+          </a:p>
+        </p:txBody>
+      </p:sp>
+      <p:grpSp>
+        <p:nvGrpSpPr>
+          <p:cNvPr id="171" name="Google Shape;171;p2"/>
+          <p:cNvGrpSpPr/>
+          <p:nvPr/>
+        </p:nvGrpSpPr>
+        <p:grpSpPr>
+          <a:xfrm>
+            <a:off x="808355" y="3169121"/>
+            <a:ext cx="3720637" cy="1022009"/>
+            <a:chOff x="824525" y="2880500"/>
+            <a:chExt cx="3935100" cy="1295650"/>
+          </a:xfrm>
+        </p:grpSpPr>
+        <p:sp>
+          <p:nvSpPr>
+            <p:cNvPr id="172" name="Google Shape;172;p2"/>
+            <p:cNvSpPr/>
+            <p:nvPr/>
+          </p:nvSpPr>
+          <p:spPr>
+            <a:xfrm>
+              <a:off x="900725" y="3002850"/>
+              <a:ext cx="3858900" cy="1173300"/>
+            </a:xfrm>
+            <a:prstGeom prst="roundRect">
+              <a:avLst>
+                <a:gd name="adj" fmla="val 50000"/>
+              </a:avLst>
+            </a:prstGeom>
+            <a:solidFill>
+              <a:schemeClr val="accent1">
+                <a:lumMod val="60000"/>
+                <a:lumOff val="40000"/>
+              </a:schemeClr>
+            </a:solidFill>
+            <a:ln>
+              <a:solidFill>
+                <a:schemeClr val="accent1"/>
+              </a:solidFill>
+            </a:ln>
+          </p:spPr>
+          <p:txBody>
+            <a:bodyPr spcFirstLastPara="1" wrap="square" lIns="91425" tIns="91425" rIns="91425" bIns="91425" anchor="ctr" anchorCtr="0">
+              <a:noAutofit/>
+            </a:bodyPr>
+            <a:lstStyle/>
+            <a:p>
+              <a:pPr>
+                <a:buClr>
+                  <a:srgbClr val="000000"/>
+                </a:buClr>
+                <a:buSzPts val="1400"/>
+                <a:buFont typeface="Arial"/>
+                <a:buNone/>
+              </a:pPr>
+              <a:r>
+                <a:rPr lang="en-US" sz="2400" dirty="0" smtClean="0">
+                  <a:solidFill>
+                    <a:srgbClr val="000000"/>
+                  </a:solidFill>
+                  <a:ea typeface="Times New Roman"/>
+                  <a:cs typeface="Times New Roman"/>
+                  <a:sym typeface="Times New Roman"/>
+                </a:rPr>
+                <a:t>Requirements </a:t>
+              </a:r>
+              <a:r>
+                <a:rPr lang="en-US" sz="2400" dirty="0">
+                  <a:solidFill>
+                    <a:srgbClr val="000000"/>
+                  </a:solidFill>
+                  <a:ea typeface="Times New Roman"/>
+                  <a:cs typeface="Times New Roman"/>
+                  <a:sym typeface="Times New Roman"/>
+                </a:rPr>
+                <a:t>and </a:t>
+              </a:r>
+              <a:r>
+                <a:rPr lang="en-US" sz="2400" dirty="0" smtClean="0">
+                  <a:solidFill>
+                    <a:srgbClr val="000000"/>
+                  </a:solidFill>
+                  <a:ea typeface="Times New Roman"/>
+                  <a:cs typeface="Times New Roman"/>
+                  <a:sym typeface="Times New Roman"/>
+                </a:rPr>
+                <a:t>Getting started</a:t>
+              </a:r>
+              <a:endParaRPr sz="2400" dirty="0">
+                <a:solidFill>
+                  <a:srgbClr val="000000"/>
+                </a:solidFill>
+                <a:ea typeface="Times New Roman"/>
+                <a:cs typeface="Times New Roman"/>
+                <a:sym typeface="Times New Roman"/>
+              </a:endParaRPr>
+            </a:p>
+          </p:txBody>
+        </p:sp>
+        <p:sp>
+          <p:nvSpPr>
+            <p:cNvPr id="173" name="Google Shape;173;p2"/>
+            <p:cNvSpPr/>
+            <p:nvPr/>
+          </p:nvSpPr>
+          <p:spPr>
+            <a:xfrm>
+              <a:off x="824525" y="2880500"/>
+              <a:ext cx="3858900" cy="1173300"/>
+            </a:xfrm>
+            <a:prstGeom prst="roundRect">
+              <a:avLst>
+                <a:gd name="adj" fmla="val 50000"/>
+              </a:avLst>
+            </a:prstGeom>
+            <a:noFill/>
+            <a:ln w="19050" cap="flat" cmpd="sng">
+              <a:solidFill>
+                <a:schemeClr val="accent1"/>
+              </a:solidFill>
+              <a:prstDash val="solid"/>
+              <a:round/>
+              <a:headEnd type="none" w="sm" len="sm"/>
+              <a:tailEnd type="none" w="sm" len="sm"/>
+            </a:ln>
+          </p:spPr>
+          <p:txBody>
+            <a:bodyPr spcFirstLastPara="1" wrap="square" lIns="91425" tIns="91425" rIns="91425" bIns="91425" anchor="ctr" anchorCtr="0">
+              <a:noAutofit/>
+            </a:bodyPr>
+            <a:lstStyle/>
+            <a:p>
+              <a:pPr marL="0" marR="0" lvl="0" indent="0" algn="l" rtl="0">
+                <a:lnSpc>
+                  <a:spcPct val="100000"/>
+                </a:lnSpc>
+                <a:spcBef>
+                  <a:spcPts val="0"/>
+                </a:spcBef>
+                <a:spcAft>
+                  <a:spcPts val="0"/>
+                </a:spcAft>
+                <a:buClr>
+                  <a:srgbClr val="000000"/>
+                </a:buClr>
+                <a:buSzPts val="1400"/>
+                <a:buFont typeface="Arial"/>
+                <a:buNone/>
+              </a:pPr>
+              <a:endParaRPr sz="1400" i="0" u="none" strike="noStrike" cap="none">
+                <a:solidFill>
+                  <a:srgbClr val="000000"/>
+                </a:solidFill>
+                <a:ea typeface="Times New Roman"/>
+                <a:cs typeface="Times New Roman"/>
+                <a:sym typeface="Times New Roman"/>
+              </a:endParaRPr>
+            </a:p>
+          </p:txBody>
+        </p:sp>
+      </p:grpSp>
+      <p:grpSp>
+        <p:nvGrpSpPr>
+          <p:cNvPr id="174" name="Google Shape;174;p2"/>
+          <p:cNvGrpSpPr/>
+          <p:nvPr/>
+        </p:nvGrpSpPr>
+        <p:grpSpPr>
+          <a:xfrm>
+            <a:off x="5399024" y="3120865"/>
+            <a:ext cx="3373560" cy="1022009"/>
+            <a:chOff x="824525" y="2880500"/>
+            <a:chExt cx="3935100" cy="1295650"/>
+          </a:xfrm>
+        </p:grpSpPr>
+        <p:sp>
+          <p:nvSpPr>
+            <p:cNvPr id="175" name="Google Shape;175;p2"/>
+            <p:cNvSpPr/>
+            <p:nvPr/>
+          </p:nvSpPr>
+          <p:spPr>
+            <a:xfrm>
+              <a:off x="900725" y="3002850"/>
+              <a:ext cx="3858900" cy="1173300"/>
+            </a:xfrm>
+            <a:prstGeom prst="roundRect">
+              <a:avLst>
+                <a:gd name="adj" fmla="val 50000"/>
+              </a:avLst>
+            </a:prstGeom>
+            <a:solidFill>
+              <a:schemeClr val="accent1">
+                <a:lumMod val="60000"/>
+                <a:lumOff val="40000"/>
+              </a:schemeClr>
+            </a:solidFill>
+            <a:ln>
+              <a:noFill/>
+            </a:ln>
+          </p:spPr>
+          <p:txBody>
+            <a:bodyPr spcFirstLastPara="1" wrap="square" lIns="91425" tIns="91425" rIns="91425" bIns="91425" anchor="ctr" anchorCtr="0">
+              <a:noAutofit/>
+            </a:bodyPr>
+            <a:lstStyle/>
+            <a:p>
+              <a:pPr marR="0" lvl="0" indent="0">
+                <a:lnSpc>
+                  <a:spcPct val="100000"/>
+                </a:lnSpc>
+                <a:spcBef>
+                  <a:spcPts val="0"/>
+                </a:spcBef>
+                <a:spcAft>
+                  <a:spcPts val="0"/>
+                </a:spcAft>
+                <a:buClr>
+                  <a:srgbClr val="000000"/>
+                </a:buClr>
+                <a:buSzPts val="1400"/>
+              </a:pPr>
+              <a:r>
+                <a:rPr lang="en-GB" sz="2400" dirty="0" smtClean="0">
+                  <a:solidFill>
+                    <a:srgbClr val="000000"/>
+                  </a:solidFill>
+                  <a:ea typeface="Times New Roman"/>
+                  <a:cs typeface="Times New Roman"/>
+                  <a:sym typeface="Times New Roman"/>
+                </a:rPr>
+                <a:t>Conclusion and demo</a:t>
+              </a:r>
+              <a:endParaRPr sz="2400" dirty="0">
+                <a:solidFill>
+                  <a:srgbClr val="000000"/>
+                </a:solidFill>
+                <a:ea typeface="Times New Roman"/>
+                <a:cs typeface="Times New Roman"/>
+                <a:sym typeface="Times New Roman"/>
+              </a:endParaRPr>
+            </a:p>
+          </p:txBody>
+        </p:sp>
+        <p:sp>
+          <p:nvSpPr>
+            <p:cNvPr id="176" name="Google Shape;176;p2"/>
+            <p:cNvSpPr/>
+            <p:nvPr/>
+          </p:nvSpPr>
+          <p:spPr>
+            <a:xfrm>
+              <a:off x="824525" y="2880500"/>
+              <a:ext cx="3858900" cy="1173300"/>
+            </a:xfrm>
+            <a:prstGeom prst="roundRect">
+              <a:avLst>
+                <a:gd name="adj" fmla="val 50000"/>
+              </a:avLst>
+            </a:prstGeom>
+            <a:noFill/>
+            <a:ln w="19050" cap="flat" cmpd="sng">
+              <a:solidFill>
+                <a:schemeClr val="accent1"/>
+              </a:solidFill>
+              <a:prstDash val="solid"/>
+              <a:round/>
+              <a:headEnd type="none" w="sm" len="sm"/>
+              <a:tailEnd type="none" w="sm" len="sm"/>
+            </a:ln>
+          </p:spPr>
+          <p:txBody>
+            <a:bodyPr spcFirstLastPara="1" wrap="square" lIns="91425" tIns="91425" rIns="91425" bIns="91425" anchor="ctr" anchorCtr="0">
+              <a:noAutofit/>
+            </a:bodyPr>
+            <a:lstStyle/>
+            <a:p>
+              <a:pPr marL="0" marR="0" lvl="0" indent="0" algn="l" rtl="0">
+                <a:lnSpc>
+                  <a:spcPct val="100000"/>
+                </a:lnSpc>
+                <a:spcBef>
+                  <a:spcPts val="0"/>
+                </a:spcBef>
+                <a:spcAft>
+                  <a:spcPts val="0"/>
+                </a:spcAft>
+                <a:buClr>
+                  <a:srgbClr val="000000"/>
+                </a:buClr>
+                <a:buSzPts val="1400"/>
+                <a:buFont typeface="Arial"/>
+                <a:buNone/>
+              </a:pPr>
+              <a:endParaRPr sz="1400" i="0" u="none" strike="noStrike" cap="none">
+                <a:solidFill>
+                  <a:srgbClr val="000000"/>
+                </a:solidFill>
+                <a:ea typeface="Times New Roman"/>
+                <a:cs typeface="Times New Roman"/>
+                <a:sym typeface="Times New Roman"/>
+              </a:endParaRPr>
+            </a:p>
+          </p:txBody>
+        </p:sp>
+      </p:grpSp>
+      <p:grpSp>
+        <p:nvGrpSpPr>
+          <p:cNvPr id="177" name="Google Shape;177;p2"/>
+          <p:cNvGrpSpPr/>
+          <p:nvPr/>
+        </p:nvGrpSpPr>
+        <p:grpSpPr>
+          <a:xfrm>
+            <a:off x="5399024" y="1611354"/>
+            <a:ext cx="3440176" cy="1022009"/>
+            <a:chOff x="824525" y="2880500"/>
+            <a:chExt cx="3935100" cy="1295650"/>
+          </a:xfrm>
+        </p:grpSpPr>
+        <p:sp>
+          <p:nvSpPr>
+            <p:cNvPr id="178" name="Google Shape;178;p2"/>
+            <p:cNvSpPr/>
+            <p:nvPr/>
+          </p:nvSpPr>
+          <p:spPr>
+            <a:xfrm>
+              <a:off x="900725" y="3002850"/>
+              <a:ext cx="3858900" cy="1173300"/>
+            </a:xfrm>
+            <a:prstGeom prst="roundRect">
+              <a:avLst>
+                <a:gd name="adj" fmla="val 50000"/>
+              </a:avLst>
+            </a:prstGeom>
+            <a:solidFill>
+              <a:schemeClr val="accent1">
+                <a:lumMod val="60000"/>
+                <a:lumOff val="40000"/>
+              </a:schemeClr>
+            </a:solidFill>
+            <a:ln>
+              <a:solidFill>
+                <a:schemeClr val="accent1"/>
+              </a:solidFill>
+            </a:ln>
+          </p:spPr>
+          <p:txBody>
+            <a:bodyPr spcFirstLastPara="1" wrap="square" lIns="91425" tIns="91425" rIns="91425" bIns="91425" anchor="ctr" anchorCtr="0">
+              <a:noAutofit/>
+            </a:bodyPr>
+            <a:lstStyle/>
+            <a:p>
+              <a:pPr>
+                <a:buClr>
+                  <a:srgbClr val="000000"/>
+                </a:buClr>
+                <a:buSzPts val="1400"/>
+                <a:buFont typeface="Arial"/>
+                <a:buNone/>
+              </a:pPr>
+              <a:r>
+                <a:rPr lang="en-US" sz="2400" dirty="0" smtClean="0">
+                  <a:solidFill>
+                    <a:srgbClr val="000000"/>
+                  </a:solidFill>
+                  <a:ea typeface="Times New Roman"/>
+                  <a:cs typeface="Times New Roman"/>
+                  <a:sym typeface="Times New Roman"/>
+                </a:rPr>
+                <a:t>Testing and evaluation</a:t>
+              </a:r>
+              <a:endParaRPr sz="2400" dirty="0">
+                <a:solidFill>
+                  <a:srgbClr val="000000"/>
+                </a:solidFill>
+                <a:ea typeface="Times New Roman"/>
+                <a:cs typeface="Times New Roman"/>
+                <a:sym typeface="Times New Roman"/>
+              </a:endParaRPr>
+            </a:p>
+          </p:txBody>
+        </p:sp>
+        <p:sp>
+          <p:nvSpPr>
+            <p:cNvPr id="179" name="Google Shape;179;p2"/>
+            <p:cNvSpPr/>
+            <p:nvPr/>
+          </p:nvSpPr>
+          <p:spPr>
+            <a:xfrm>
+              <a:off x="824525" y="2880500"/>
+              <a:ext cx="3858900" cy="1173300"/>
+            </a:xfrm>
+            <a:prstGeom prst="roundRect">
+              <a:avLst>
+                <a:gd name="adj" fmla="val 50000"/>
+              </a:avLst>
+            </a:prstGeom>
+            <a:noFill/>
+            <a:ln>
+              <a:solidFill>
+                <a:schemeClr val="accent1"/>
+              </a:solidFill>
+            </a:ln>
+          </p:spPr>
+          <p:txBody>
+            <a:bodyPr spcFirstLastPara="1" wrap="square" lIns="91425" tIns="91425" rIns="91425" bIns="91425" anchor="ctr" anchorCtr="0">
+              <a:noAutofit/>
+            </a:bodyPr>
+            <a:lstStyle/>
+            <a:p>
+              <a:pPr>
+                <a:buClr>
+                  <a:srgbClr val="000000"/>
+                </a:buClr>
+                <a:buSzPts val="1400"/>
+                <a:buFont typeface="Arial"/>
+                <a:buNone/>
+              </a:pPr>
+              <a:endParaRPr sz="2400">
+                <a:solidFill>
+                  <a:srgbClr val="000000"/>
+                </a:solidFill>
+                <a:ea typeface="Times New Roman"/>
+                <a:cs typeface="Times New Roman"/>
+                <a:sym typeface="Times New Roman"/>
+              </a:endParaRPr>
+            </a:p>
+          </p:txBody>
+        </p:sp>
+      </p:grpSp>
+      <p:grpSp>
+        <p:nvGrpSpPr>
+          <p:cNvPr id="183" name="Google Shape;183;p2"/>
+          <p:cNvGrpSpPr/>
+          <p:nvPr/>
+        </p:nvGrpSpPr>
+        <p:grpSpPr>
+          <a:xfrm>
+            <a:off x="808349" y="4907221"/>
+            <a:ext cx="3720637" cy="1022009"/>
+            <a:chOff x="824525" y="2880500"/>
+            <a:chExt cx="3935100" cy="1295650"/>
+          </a:xfrm>
+        </p:grpSpPr>
+        <p:sp>
+          <p:nvSpPr>
+            <p:cNvPr id="184" name="Google Shape;184;p2"/>
+            <p:cNvSpPr/>
+            <p:nvPr/>
+          </p:nvSpPr>
+          <p:spPr>
+            <a:xfrm>
+              <a:off x="900725" y="3002850"/>
+              <a:ext cx="3858900" cy="1173300"/>
+            </a:xfrm>
+            <a:prstGeom prst="roundRect">
+              <a:avLst>
+                <a:gd name="adj" fmla="val 50000"/>
+              </a:avLst>
+            </a:prstGeom>
+            <a:solidFill>
+              <a:schemeClr val="accent1">
+                <a:lumMod val="60000"/>
+                <a:lumOff val="40000"/>
+              </a:schemeClr>
+            </a:solidFill>
+            <a:ln>
+              <a:noFill/>
+            </a:ln>
+          </p:spPr>
+          <p:txBody>
+            <a:bodyPr spcFirstLastPara="1" wrap="square" lIns="91425" tIns="91425" rIns="91425" bIns="91425" anchor="ctr" anchorCtr="0">
+              <a:noAutofit/>
+            </a:bodyPr>
+            <a:lstStyle/>
+            <a:p>
+              <a:pPr>
+                <a:buClr>
+                  <a:srgbClr val="000000"/>
+                </a:buClr>
+                <a:buSzPts val="1400"/>
+                <a:buFont typeface="Arial"/>
+                <a:buNone/>
+              </a:pPr>
+              <a:r>
+                <a:rPr lang="en-US" sz="2400" dirty="0" smtClean="0">
+                  <a:solidFill>
+                    <a:srgbClr val="000000"/>
+                  </a:solidFill>
+                  <a:ea typeface="Times New Roman"/>
+                  <a:cs typeface="Times New Roman"/>
+                  <a:sym typeface="Times New Roman"/>
+                </a:rPr>
+                <a:t>Implementation of </a:t>
+              </a:r>
+            </a:p>
+            <a:p>
+              <a:pPr>
+                <a:buClr>
+                  <a:srgbClr val="000000"/>
+                </a:buClr>
+                <a:buSzPts val="1400"/>
+                <a:buFont typeface="Arial"/>
+                <a:buNone/>
+              </a:pPr>
+              <a:r>
+                <a:rPr lang="en-US" sz="2400" dirty="0" smtClean="0">
+                  <a:solidFill>
+                    <a:srgbClr val="000000"/>
+                  </a:solidFill>
+                  <a:ea typeface="Times New Roman"/>
+                  <a:cs typeface="Times New Roman"/>
+                  <a:sym typeface="Times New Roman"/>
+                </a:rPr>
+                <a:t>App SDR</a:t>
+              </a:r>
+              <a:endParaRPr sz="2400" dirty="0">
+                <a:solidFill>
+                  <a:srgbClr val="000000"/>
+                </a:solidFill>
+                <a:ea typeface="Times New Roman"/>
+                <a:cs typeface="Times New Roman"/>
+                <a:sym typeface="Times New Roman"/>
+              </a:endParaRPr>
+            </a:p>
+          </p:txBody>
+        </p:sp>
+        <p:sp>
+          <p:nvSpPr>
+            <p:cNvPr id="185" name="Google Shape;185;p2"/>
+            <p:cNvSpPr/>
+            <p:nvPr/>
+          </p:nvSpPr>
+          <p:spPr>
+            <a:xfrm>
+              <a:off x="824525" y="2880500"/>
+              <a:ext cx="3858900" cy="1173300"/>
+            </a:xfrm>
+            <a:prstGeom prst="roundRect">
+              <a:avLst>
+                <a:gd name="adj" fmla="val 50000"/>
+              </a:avLst>
+            </a:prstGeom>
+            <a:noFill/>
+            <a:ln w="19050" cap="flat" cmpd="sng">
+              <a:solidFill>
+                <a:schemeClr val="accent1"/>
+              </a:solidFill>
+              <a:prstDash val="solid"/>
+              <a:round/>
+              <a:headEnd type="none" w="sm" len="sm"/>
+              <a:tailEnd type="none" w="sm" len="sm"/>
+            </a:ln>
+          </p:spPr>
+          <p:txBody>
+            <a:bodyPr spcFirstLastPara="1" wrap="square" lIns="91425" tIns="91425" rIns="91425" bIns="91425" anchor="ctr" anchorCtr="0">
+              <a:noAutofit/>
+            </a:bodyPr>
+            <a:lstStyle/>
+            <a:p>
+              <a:pPr marL="0" marR="0" lvl="0" indent="0" algn="l" rtl="0">
+                <a:lnSpc>
+                  <a:spcPct val="100000"/>
+                </a:lnSpc>
+                <a:spcBef>
+                  <a:spcPts val="0"/>
+                </a:spcBef>
+                <a:spcAft>
+                  <a:spcPts val="0"/>
+                </a:spcAft>
+                <a:buClr>
+                  <a:srgbClr val="000000"/>
+                </a:buClr>
+                <a:buSzPts val="1400"/>
+                <a:buFont typeface="Arial"/>
+                <a:buNone/>
+              </a:pPr>
+              <a:endParaRPr sz="1400" i="0" u="none" strike="noStrike" cap="none">
+                <a:solidFill>
+                  <a:srgbClr val="000000"/>
+                </a:solidFill>
+                <a:ea typeface="Times New Roman"/>
+                <a:cs typeface="Times New Roman"/>
+                <a:sym typeface="Times New Roman"/>
+              </a:endParaRPr>
+            </a:p>
+          </p:txBody>
+        </p:sp>
+      </p:grpSp>
+      <p:pic>
+        <p:nvPicPr>
+          <p:cNvPr id="38" name="Picture 37"/>
+          <p:cNvPicPr/>
+          <p:nvPr/>
+        </p:nvPicPr>
+        <p:blipFill>
+          <a:blip r:embed="rId3"/>
+          <a:srcRect l="1123" t="1436" r="86016" b="93173"/>
+          <a:stretch>
+            <a:fillRect/>
+          </a:stretch>
+        </p:blipFill>
+        <p:spPr bwMode="auto">
+          <a:xfrm>
+            <a:off x="-1" y="0"/>
+            <a:ext cx="1805777" cy="884117"/>
+          </a:xfrm>
+          <a:prstGeom prst="rect">
+            <a:avLst/>
+          </a:prstGeom>
+        </p:spPr>
+      </p:pic>
+      <p:cxnSp>
+        <p:nvCxnSpPr>
+          <p:cNvPr id="33" name="Straight Connector 32"/>
+          <p:cNvCxnSpPr/>
+          <p:nvPr/>
+        </p:nvCxnSpPr>
+        <p:spPr>
+          <a:xfrm>
+            <a:off x="0" y="1028733"/>
+            <a:ext cx="9144000" cy="0"/>
+          </a:xfrm>
+          <a:prstGeom prst="line">
+            <a:avLst/>
+          </a:prstGeom>
+          <a:ln w="19050"/>
+        </p:spPr>
+        <p:style>
+          <a:lnRef idx="1">
+            <a:schemeClr val="accent1"/>
+          </a:lnRef>
+          <a:fillRef idx="0">
+            <a:schemeClr val="accent1"/>
+          </a:fillRef>
+          <a:effectRef idx="0">
+            <a:schemeClr val="accent1"/>
+          </a:effectRef>
+          <a:fontRef idx="minor">
+            <a:schemeClr val="tx1"/>
+          </a:fontRef>
+        </p:style>
+      </p:cxnSp>
+    </p:spTree>
+    <p:extLst>
+      <p:ext uri="{BB962C8B-B14F-4D97-AF65-F5344CB8AC3E}">
+        <p14:creationId xmlns:p14="http://schemas.microsoft.com/office/powerpoint/2010/main" val="2860661024"/>
+      </p:ext>
+    </p:extLst>
+  </p:cSld>
+  <p:clrMapOvr>
+    <a:masterClrMapping/>
+  </p:clrMapOvr>
+  <p:timing>
+    <p:tnLst>
+      <p:par>
+        <p:cTn id="1" dur="indefinite" restart="never" nodeType="tmRoot"/>
+      </p:par>
+    </p:tnLst>
+  </p:timing>
+</p:sld>
+</file>
+
+<file path=ppt/slides/slide3.xml><?xml version="1.0" encoding="utf-8"?>
 <p:sld xmlns:a="http://schemas.openxmlformats.org/drawingml/2006/main" xmlns:r="http://schemas.openxmlformats.org/officeDocument/2006/relationships" xmlns:p="http://schemas.openxmlformats.org/presentationml/2006/main">
   <p:cSld>
     <p:spTree>
@@ -16556,7 +17795,7 @@
 </p:sld>
 </file>
 
-<file path=ppt/slides/slide3.xml><?xml version="1.0" encoding="utf-8"?>
+<file path=ppt/slides/slide4.xml><?xml version="1.0" encoding="utf-8"?>
 <p:sld xmlns:a="http://schemas.openxmlformats.org/drawingml/2006/main" xmlns:r="http://schemas.openxmlformats.org/officeDocument/2006/relationships" xmlns:p="http://schemas.openxmlformats.org/presentationml/2006/main">
   <p:cSld>
     <p:spTree>
@@ -16791,7 +18030,7 @@
         </p:nvSpPr>
         <p:spPr>
           <a:xfrm>
-            <a:off x="0" y="1219200"/>
+            <a:off x="-1" y="1046202"/>
             <a:ext cx="3352800" cy="553998"/>
           </a:xfrm>
           <a:prstGeom prst="rect">
@@ -16821,7 +18060,7 @@
         </p:nvSpPr>
         <p:spPr>
           <a:xfrm>
-            <a:off x="372533" y="2158692"/>
+            <a:off x="364067" y="1600200"/>
             <a:ext cx="4419600" cy="3477875"/>
           </a:xfrm>
           <a:prstGeom prst="rect">
@@ -16992,293 +18231,15 @@
           </a:fontRef>
         </p:style>
       </p:cxnSp>
-    </p:spTree>
-    <p:extLst>
-      <p:ext uri="{BB962C8B-B14F-4D97-AF65-F5344CB8AC3E}">
-        <p14:creationId xmlns:p14="http://schemas.microsoft.com/office/powerpoint/2010/main" val="224440414"/>
-      </p:ext>
-    </p:extLst>
-  </p:cSld>
-  <p:clrMapOvr>
-    <a:masterClrMapping/>
-  </p:clrMapOvr>
-  <p:timing>
-    <p:tnLst>
-      <p:par>
-        <p:cTn id="1" dur="indefinite" restart="never" nodeType="tmRoot"/>
-      </p:par>
-    </p:tnLst>
-  </p:timing>
-</p:sld>
-</file>
-
-<file path=ppt/slides/slide4.xml><?xml version="1.0" encoding="utf-8"?>
-<p:sld xmlns:a="http://schemas.openxmlformats.org/drawingml/2006/main" xmlns:r="http://schemas.openxmlformats.org/officeDocument/2006/relationships" xmlns:p="http://schemas.openxmlformats.org/presentationml/2006/main">
-  <p:cSld>
-    <p:spTree>
-      <p:nvGrpSpPr>
-        <p:cNvPr id="1" name="Shape 480"/>
-        <p:cNvGrpSpPr/>
-        <p:nvPr/>
-      </p:nvGrpSpPr>
-      <p:grpSpPr>
-        <a:xfrm>
-          <a:off x="0" y="0"/>
-          <a:ext cx="0" cy="0"/>
-          <a:chOff x="0" y="0"/>
-          <a:chExt cx="0" cy="0"/>
-        </a:xfrm>
-      </p:grpSpPr>
-      <p:cxnSp>
-        <p:nvCxnSpPr>
-          <p:cNvPr id="6" name="Straight Connector 5"/>
-          <p:cNvCxnSpPr/>
-          <p:nvPr/>
-        </p:nvCxnSpPr>
-        <p:spPr>
-          <a:xfrm>
-            <a:off x="0" y="1219200"/>
-            <a:ext cx="9144000" cy="0"/>
-          </a:xfrm>
-          <a:prstGeom prst="line">
-            <a:avLst/>
-          </a:prstGeom>
-          <a:ln w="19050"/>
-        </p:spPr>
-        <p:style>
-          <a:lnRef idx="1">
-            <a:schemeClr val="accent1"/>
-          </a:lnRef>
-          <a:fillRef idx="0">
-            <a:schemeClr val="accent1"/>
-          </a:fillRef>
-          <a:effectRef idx="0">
-            <a:schemeClr val="accent1"/>
-          </a:effectRef>
-          <a:fontRef idx="minor">
-            <a:schemeClr val="tx1"/>
-          </a:fontRef>
-        </p:style>
-      </p:cxnSp>
-      <p:pic>
-        <p:nvPicPr>
-          <p:cNvPr id="10" name="Picture 9"/>
-          <p:cNvPicPr/>
-          <p:nvPr/>
-        </p:nvPicPr>
-        <p:blipFill>
-          <a:blip r:embed="rId3"/>
-          <a:srcRect l="1123" t="1436" r="86016" b="93173"/>
-          <a:stretch>
-            <a:fillRect/>
-          </a:stretch>
-        </p:blipFill>
-        <p:spPr bwMode="auto">
-          <a:xfrm>
-            <a:off x="-1" y="0"/>
-            <a:ext cx="1805777" cy="884117"/>
-          </a:xfrm>
-          <a:prstGeom prst="rect">
-            <a:avLst/>
-          </a:prstGeom>
-        </p:spPr>
-      </p:pic>
       <p:sp>
         <p:nvSpPr>
-          <p:cNvPr id="9" name="Google Shape;297;p9"/>
-          <p:cNvSpPr txBox="1">
-            <a:spLocks/>
-          </p:cNvSpPr>
-          <p:nvPr/>
-        </p:nvSpPr>
-        <p:spPr>
-          <a:xfrm>
-            <a:off x="1524000" y="442058"/>
-            <a:ext cx="6781800" cy="768000"/>
-          </a:xfrm>
-          <a:prstGeom prst="rect">
-            <a:avLst/>
-          </a:prstGeom>
-          <a:noFill/>
-          <a:ln>
-            <a:noFill/>
-          </a:ln>
-        </p:spPr>
-        <p:txBody>
-          <a:bodyPr spcFirstLastPara="1" vert="horz" wrap="square" lIns="91425" tIns="91425" rIns="91425" bIns="91425" rtlCol="0" anchor="ctr" anchorCtr="0">
-            <a:noAutofit/>
-          </a:bodyPr>
-          <a:lstStyle>
-            <a:lvl1pPr lvl="0" algn="ctr" defTabSz="914400" rtl="0" eaLnBrk="1" latinLnBrk="0" hangingPunct="1">
-              <a:lnSpc>
-                <a:spcPct val="100000"/>
-              </a:lnSpc>
-              <a:spcBef>
-                <a:spcPts val="0"/>
-              </a:spcBef>
-              <a:spcAft>
-                <a:spcPts val="0"/>
-              </a:spcAft>
-              <a:buSzPts val="2800"/>
-              <a:buNone/>
-              <a:defRPr sz="4400" kern="1200">
-                <a:solidFill>
-                  <a:schemeClr val="tx1"/>
-                </a:solidFill>
-                <a:latin typeface="+mj-lt"/>
-                <a:ea typeface="+mj-ea"/>
-                <a:cs typeface="+mj-cs"/>
-              </a:defRPr>
-            </a:lvl1pPr>
-            <a:lvl2pPr lvl="1" algn="l">
-              <a:lnSpc>
-                <a:spcPct val="100000"/>
-              </a:lnSpc>
-              <a:spcBef>
-                <a:spcPts val="0"/>
-              </a:spcBef>
-              <a:spcAft>
-                <a:spcPts val="0"/>
-              </a:spcAft>
-              <a:buSzPts val="2800"/>
-              <a:buNone/>
-              <a:defRPr/>
-            </a:lvl2pPr>
-            <a:lvl3pPr lvl="2" algn="l">
-              <a:lnSpc>
-                <a:spcPct val="100000"/>
-              </a:lnSpc>
-              <a:spcBef>
-                <a:spcPts val="0"/>
-              </a:spcBef>
-              <a:spcAft>
-                <a:spcPts val="0"/>
-              </a:spcAft>
-              <a:buSzPts val="2800"/>
-              <a:buNone/>
-              <a:defRPr/>
-            </a:lvl3pPr>
-            <a:lvl4pPr lvl="3" algn="l">
-              <a:lnSpc>
-                <a:spcPct val="100000"/>
-              </a:lnSpc>
-              <a:spcBef>
-                <a:spcPts val="0"/>
-              </a:spcBef>
-              <a:spcAft>
-                <a:spcPts val="0"/>
-              </a:spcAft>
-              <a:buSzPts val="2800"/>
-              <a:buNone/>
-              <a:defRPr/>
-            </a:lvl4pPr>
-            <a:lvl5pPr lvl="4" algn="l">
-              <a:lnSpc>
-                <a:spcPct val="100000"/>
-              </a:lnSpc>
-              <a:spcBef>
-                <a:spcPts val="0"/>
-              </a:spcBef>
-              <a:spcAft>
-                <a:spcPts val="0"/>
-              </a:spcAft>
-              <a:buSzPts val="2800"/>
-              <a:buNone/>
-              <a:defRPr/>
-            </a:lvl5pPr>
-            <a:lvl6pPr lvl="5" algn="l">
-              <a:lnSpc>
-                <a:spcPct val="100000"/>
-              </a:lnSpc>
-              <a:spcBef>
-                <a:spcPts val="0"/>
-              </a:spcBef>
-              <a:spcAft>
-                <a:spcPts val="0"/>
-              </a:spcAft>
-              <a:buSzPts val="2800"/>
-              <a:buNone/>
-              <a:defRPr/>
-            </a:lvl6pPr>
-            <a:lvl7pPr lvl="6" algn="l">
-              <a:lnSpc>
-                <a:spcPct val="100000"/>
-              </a:lnSpc>
-              <a:spcBef>
-                <a:spcPts val="0"/>
-              </a:spcBef>
-              <a:spcAft>
-                <a:spcPts val="0"/>
-              </a:spcAft>
-              <a:buSzPts val="2800"/>
-              <a:buNone/>
-              <a:defRPr/>
-            </a:lvl7pPr>
-            <a:lvl8pPr lvl="7" algn="l">
-              <a:lnSpc>
-                <a:spcPct val="100000"/>
-              </a:lnSpc>
-              <a:spcBef>
-                <a:spcPts val="0"/>
-              </a:spcBef>
-              <a:spcAft>
-                <a:spcPts val="0"/>
-              </a:spcAft>
-              <a:buSzPts val="2800"/>
-              <a:buNone/>
-              <a:defRPr/>
-            </a:lvl8pPr>
-            <a:lvl9pPr lvl="8" algn="l">
-              <a:lnSpc>
-                <a:spcPct val="100000"/>
-              </a:lnSpc>
-              <a:spcBef>
-                <a:spcPts val="0"/>
-              </a:spcBef>
-              <a:spcAft>
-                <a:spcPts val="0"/>
-              </a:spcAft>
-              <a:buSzPts val="2800"/>
-              <a:buNone/>
-              <a:defRPr/>
-            </a:lvl9pPr>
-          </a:lstStyle>
-          <a:p>
-            <a:r>
-              <a:rPr lang="en-GB" sz="3400" b="1" dirty="0" smtClean="0">
-                <a:solidFill>
-                  <a:schemeClr val="tx1">
-                    <a:lumMod val="50000"/>
-                  </a:schemeClr>
-                </a:solidFill>
-                <a:ea typeface="Times New Roman"/>
-                <a:cs typeface="Times New Roman"/>
-                <a:sym typeface="Times New Roman"/>
-              </a:rPr>
-              <a:t>2. Requirements and Getting Started</a:t>
-            </a:r>
-            <a:endParaRPr lang="en-GB" sz="3400" b="1" dirty="0">
-              <a:solidFill>
-                <a:schemeClr val="tx1">
-                  <a:lumMod val="50000"/>
-                </a:schemeClr>
-              </a:solidFill>
-              <a:ea typeface="Times New Roman"/>
-              <a:cs typeface="Times New Roman"/>
-              <a:sym typeface="Times New Roman"/>
-            </a:endParaRPr>
-          </a:p>
-        </p:txBody>
-      </p:sp>
-      <p:sp>
-        <p:nvSpPr>
-          <p:cNvPr id="5" name="TextBox 4"/>
+          <p:cNvPr id="12" name="TextBox 11"/>
           <p:cNvSpPr txBox="1"/>
           <p:nvPr/>
         </p:nvSpPr>
         <p:spPr>
           <a:xfrm>
-            <a:off x="0" y="1219200"/>
+            <a:off x="-1" y="5078075"/>
             <a:ext cx="3048000" cy="553998"/>
           </a:xfrm>
           <a:prstGeom prst="rect">
@@ -17302,14 +18263,14 @@
       </p:sp>
       <p:sp>
         <p:nvSpPr>
-          <p:cNvPr id="2" name="Rectangle 1"/>
+          <p:cNvPr id="13" name="Rectangle 12"/>
           <p:cNvSpPr/>
           <p:nvPr/>
         </p:nvSpPr>
         <p:spPr>
           <a:xfrm>
-            <a:off x="571500" y="2209800"/>
-            <a:ext cx="8001000" cy="3477875"/>
+            <a:off x="364067" y="5632073"/>
+            <a:ext cx="4419600" cy="1015663"/>
           </a:xfrm>
           <a:prstGeom prst="rect">
             <a:avLst/>
@@ -17321,13 +18282,13 @@
           </a:bodyPr>
           <a:lstStyle/>
           <a:p>
-            <a:r>
-              <a:rPr lang="en-GB" sz="2000" dirty="0"/>
-              <a:t>The project integrates the latest </a:t>
-            </a:r>
+            <a:pPr marL="342900" indent="-342900">
+              <a:buFont typeface="Arial" pitchFamily="34" charset="0"/>
+              <a:buChar char="•"/>
+            </a:pPr>
             <a:r>
               <a:rPr lang="en-GB" sz="2000" dirty="0" smtClean="0"/>
-              <a:t>update </a:t>
+              <a:t>Latest update </a:t>
             </a:r>
             <a:r>
               <a:rPr lang="en-GB" sz="2000" dirty="0" smtClean="0">
@@ -17337,105 +18298,36 @@
             </a:r>
             <a:r>
               <a:rPr lang="en-GB" sz="2000" dirty="0" smtClean="0"/>
-              <a:t> Install </a:t>
+              <a:t> </a:t>
+            </a:r>
+            <a:r>
+              <a:rPr lang="en-GB" sz="2000" dirty="0" smtClean="0"/>
+              <a:t>Microsoft </a:t>
             </a:r>
             <a:r>
               <a:rPr lang="en-GB" sz="2000" dirty="0"/>
-              <a:t>at least the following version of IDE, text editor, and MAUI.</a:t>
-            </a:r>
-          </a:p>
-          <a:p>
-            <a:pPr marL="342900" indent="-342900">
-              <a:buFont typeface="Arial" pitchFamily="34" charset="0"/>
-              <a:buChar char="•"/>
-            </a:pPr>
+              <a:t>Visual Studio Community 2022 - </a:t>
+            </a:r>
+            <a:r>
+              <a:rPr lang="en-GB" sz="2000" dirty="0" smtClean="0"/>
+              <a:t>v17.8.6 and .NET </a:t>
+            </a:r>
             <a:r>
               <a:rPr lang="en-GB" sz="2000" dirty="0"/>
-              <a:t>Microsoft Visual Studio Community 2022 - v17.8.6 </a:t>
+              <a:t>MAUI </a:t>
             </a:r>
             <a:r>
               <a:rPr lang="en-GB" sz="2000" dirty="0" smtClean="0"/>
-              <a:t>-</a:t>
-            </a:r>
-            <a:r>
-              <a:rPr lang="en-GB" sz="2000" dirty="0" smtClean="0">
-                <a:hlinkClick r:id="rId4" tooltip="https://learn.microsoft.com/en-us/visualstudio/releases/2022/release-notes-v17.8"/>
-              </a:rPr>
-              <a:t>https</a:t>
-            </a:r>
-            <a:r>
-              <a:rPr lang="en-GB" sz="2000" dirty="0">
-                <a:hlinkClick r:id="rId4" tooltip="https://learn.microsoft.com/en-us/visualstudio/releases/2022/release-notes-v17.8"/>
-              </a:rPr>
-              <a:t>://learn.microsoft.com/en-us/visualstudio/releases/2022/release-notes-v17.8</a:t>
-            </a:r>
-            <a:endParaRPr lang="en-GB" sz="2000" dirty="0"/>
-          </a:p>
-          <a:p>
-            <a:pPr marL="342900" indent="-342900">
-              <a:buFont typeface="Arial" pitchFamily="34" charset="0"/>
-              <a:buChar char="•"/>
-            </a:pPr>
-            <a:r>
-              <a:rPr lang="en-GB" sz="2000" dirty="0"/>
-              <a:t>.NET MAUI 8.0 - when installing Visual Studio, choose .NET MAUI to integrate along with the installation. </a:t>
+              <a:t>8.0</a:t>
             </a:r>
             <a:endParaRPr lang="en-GB" sz="2000" dirty="0" smtClean="0"/>
-          </a:p>
-          <a:p>
-            <a:pPr marL="355600" indent="-355600"/>
-            <a:r>
-              <a:rPr lang="en-GB" sz="2000" dirty="0" smtClean="0">
-                <a:sym typeface="Wingdings" pitchFamily="2" charset="2"/>
-              </a:rPr>
-              <a:t>	 </a:t>
-            </a:r>
-            <a:r>
-              <a:rPr lang="en-GB" sz="2000" dirty="0" smtClean="0"/>
-              <a:t>From v17.8.6</a:t>
-            </a:r>
-            <a:r>
-              <a:rPr lang="en-GB" sz="2000" dirty="0"/>
-              <a:t>, .NET MAUI 8.0 </a:t>
-            </a:r>
-            <a:r>
-              <a:rPr lang="en-GB" sz="2000" dirty="0" smtClean="0"/>
-              <a:t>automatically supported.</a:t>
-            </a:r>
-          </a:p>
-          <a:p>
-            <a:pPr marL="342900" indent="-342900">
-              <a:buFont typeface="Arial" pitchFamily="34" charset="0"/>
-              <a:buChar char="•"/>
-            </a:pPr>
-            <a:r>
-              <a:rPr lang="en-GB" sz="2000" dirty="0"/>
-              <a:t>More information: </a:t>
-            </a:r>
-            <a:r>
-              <a:rPr lang="en-GB" sz="2000" dirty="0">
-                <a:hlinkClick r:id="rId5"/>
-              </a:rPr>
-              <a:t>https://</a:t>
-            </a:r>
-            <a:r>
-              <a:rPr lang="en-GB" sz="2000" dirty="0" smtClean="0">
-                <a:hlinkClick r:id="rId5"/>
-              </a:rPr>
-              <a:t>github.com/tongngocminhanh/MAUI_App_SDR/tree/master/MySEProject</a:t>
-            </a:r>
-            <a:r>
-              <a:rPr lang="en-GB" sz="2000" dirty="0" smtClean="0"/>
-              <a:t> </a:t>
-            </a:r>
-            <a:endParaRPr lang="en-GB" sz="2000" dirty="0"/>
           </a:p>
         </p:txBody>
       </p:sp>
     </p:spTree>
     <p:extLst>
       <p:ext uri="{BB962C8B-B14F-4D97-AF65-F5344CB8AC3E}">
-        <p14:creationId xmlns:p14="http://schemas.microsoft.com/office/powerpoint/2010/main" val="2464085530"/>
+        <p14:creationId xmlns:p14="http://schemas.microsoft.com/office/powerpoint/2010/main" val="224440414"/>
       </p:ext>
     </p:extLst>
   </p:cSld>
@@ -18597,454 +19489,6 @@
           </a:p>
         </p:txBody>
       </p:sp>
-      <p:sp>
-        <p:nvSpPr>
-          <p:cNvPr id="2" name="TextBox 1"/>
-          <p:cNvSpPr txBox="1"/>
-          <p:nvPr/>
-        </p:nvSpPr>
-        <p:spPr>
-          <a:xfrm>
-            <a:off x="685800" y="2133600"/>
-            <a:ext cx="7543800" cy="3416320"/>
-          </a:xfrm>
-          <a:prstGeom prst="rect">
-            <a:avLst/>
-          </a:prstGeom>
-          <a:noFill/>
-        </p:spPr>
-        <p:txBody>
-          <a:bodyPr wrap="square" rtlCol="0">
-            <a:spAutoFit/>
-          </a:bodyPr>
-          <a:lstStyle/>
-          <a:p>
-            <a:pPr>
-              <a:lnSpc>
-                <a:spcPct val="200000"/>
-              </a:lnSpc>
-            </a:pPr>
-            <a:r>
-              <a:rPr lang="en-GB" dirty="0"/>
-              <a:t>The primary idea of all drawing functions is based on three </a:t>
-            </a:r>
-            <a:r>
-              <a:rPr lang="en-GB" i="1" dirty="0" err="1"/>
-              <a:t>ICanvas</a:t>
-            </a:r>
-            <a:r>
-              <a:rPr lang="en-GB" dirty="0"/>
-              <a:t> methods:</a:t>
-            </a:r>
-          </a:p>
-          <a:p>
-            <a:pPr marL="285750" indent="-285750">
-              <a:lnSpc>
-                <a:spcPct val="200000"/>
-              </a:lnSpc>
-              <a:buFont typeface="Arial" pitchFamily="34" charset="0"/>
-              <a:buChar char="•"/>
-            </a:pPr>
-            <a:r>
-              <a:rPr lang="en-GB" dirty="0" err="1"/>
-              <a:t>DrawString</a:t>
-            </a:r>
-            <a:r>
-              <a:rPr lang="en-GB" dirty="0"/>
-              <a:t>(string value, float x, float y, </a:t>
-            </a:r>
-            <a:r>
-              <a:rPr lang="en-GB" dirty="0" err="1"/>
-              <a:t>HorizontalAlignment</a:t>
-            </a:r>
-            <a:r>
-              <a:rPr lang="en-GB" dirty="0"/>
-              <a:t> </a:t>
-            </a:r>
-            <a:r>
-              <a:rPr lang="en-GB" dirty="0" err="1"/>
-              <a:t>horizontalAlignment</a:t>
-            </a:r>
-            <a:r>
-              <a:rPr lang="en-GB" dirty="0"/>
-              <a:t>, </a:t>
-            </a:r>
-            <a:r>
-              <a:rPr lang="en-GB" dirty="0" err="1"/>
-              <a:t>VerticalAlignment</a:t>
-            </a:r>
-            <a:r>
-              <a:rPr lang="en-GB" dirty="0"/>
-              <a:t> </a:t>
-            </a:r>
-            <a:r>
-              <a:rPr lang="en-GB" dirty="0" err="1"/>
-              <a:t>verticalAlignment</a:t>
-            </a:r>
-            <a:r>
-              <a:rPr lang="en-GB" dirty="0"/>
-              <a:t>)</a:t>
-            </a:r>
-          </a:p>
-          <a:p>
-            <a:pPr marL="285750" indent="-285750">
-              <a:lnSpc>
-                <a:spcPct val="200000"/>
-              </a:lnSpc>
-              <a:buFont typeface="Arial" pitchFamily="34" charset="0"/>
-              <a:buChar char="•"/>
-            </a:pPr>
-            <a:r>
-              <a:rPr lang="en-GB" dirty="0" err="1"/>
-              <a:t>DrawRectangle</a:t>
-            </a:r>
-            <a:r>
-              <a:rPr lang="en-GB" dirty="0"/>
-              <a:t>(float x, float y, float width, float height)</a:t>
-            </a:r>
-          </a:p>
-          <a:p>
-            <a:pPr marL="285750" indent="-285750">
-              <a:lnSpc>
-                <a:spcPct val="200000"/>
-              </a:lnSpc>
-              <a:buFont typeface="Arial" pitchFamily="34" charset="0"/>
-              <a:buChar char="•"/>
-            </a:pPr>
-            <a:r>
-              <a:rPr lang="en-GB" dirty="0" err="1"/>
-              <a:t>DrawRoundedRectangle</a:t>
-            </a:r>
-            <a:r>
-              <a:rPr lang="en-GB" dirty="0"/>
-              <a:t>(float x, float y, float width, float height, float </a:t>
-            </a:r>
-            <a:r>
-              <a:rPr lang="en-GB" dirty="0" err="1"/>
-              <a:t>cornerRadius</a:t>
-            </a:r>
-            <a:r>
-              <a:rPr lang="en-GB" dirty="0"/>
-              <a:t>)</a:t>
-            </a:r>
-          </a:p>
-        </p:txBody>
-      </p:sp>
-    </p:spTree>
-    <p:extLst>
-      <p:ext uri="{BB962C8B-B14F-4D97-AF65-F5344CB8AC3E}">
-        <p14:creationId xmlns:p14="http://schemas.microsoft.com/office/powerpoint/2010/main" val="2823905067"/>
-      </p:ext>
-    </p:extLst>
-  </p:cSld>
-  <p:clrMapOvr>
-    <a:masterClrMapping/>
-  </p:clrMapOvr>
-  <p:timing>
-    <p:tnLst>
-      <p:par>
-        <p:cTn id="1" dur="indefinite" restart="never" nodeType="tmRoot"/>
-      </p:par>
-    </p:tnLst>
-  </p:timing>
-</p:sld>
-</file>
-
-<file path=ppt/slides/slide8.xml><?xml version="1.0" encoding="utf-8"?>
-<p:sld xmlns:a="http://schemas.openxmlformats.org/drawingml/2006/main" xmlns:r="http://schemas.openxmlformats.org/officeDocument/2006/relationships" xmlns:p="http://schemas.openxmlformats.org/presentationml/2006/main">
-  <p:cSld>
-    <p:spTree>
-      <p:nvGrpSpPr>
-        <p:cNvPr id="1" name="Shape 480"/>
-        <p:cNvGrpSpPr/>
-        <p:nvPr/>
-      </p:nvGrpSpPr>
-      <p:grpSpPr>
-        <a:xfrm>
-          <a:off x="0" y="0"/>
-          <a:ext cx="0" cy="0"/>
-          <a:chOff x="0" y="0"/>
-          <a:chExt cx="0" cy="0"/>
-        </a:xfrm>
-      </p:grpSpPr>
-      <p:cxnSp>
-        <p:nvCxnSpPr>
-          <p:cNvPr id="6" name="Straight Connector 5"/>
-          <p:cNvCxnSpPr/>
-          <p:nvPr/>
-        </p:nvCxnSpPr>
-        <p:spPr>
-          <a:xfrm>
-            <a:off x="0" y="1219200"/>
-            <a:ext cx="9144000" cy="0"/>
-          </a:xfrm>
-          <a:prstGeom prst="line">
-            <a:avLst/>
-          </a:prstGeom>
-          <a:ln w="19050"/>
-        </p:spPr>
-        <p:style>
-          <a:lnRef idx="1">
-            <a:schemeClr val="accent1"/>
-          </a:lnRef>
-          <a:fillRef idx="0">
-            <a:schemeClr val="accent1"/>
-          </a:fillRef>
-          <a:effectRef idx="0">
-            <a:schemeClr val="accent1"/>
-          </a:effectRef>
-          <a:fontRef idx="minor">
-            <a:schemeClr val="tx1"/>
-          </a:fontRef>
-        </p:style>
-      </p:cxnSp>
-      <p:pic>
-        <p:nvPicPr>
-          <p:cNvPr id="10" name="Picture 9"/>
-          <p:cNvPicPr/>
-          <p:nvPr/>
-        </p:nvPicPr>
-        <p:blipFill>
-          <a:blip r:embed="rId3"/>
-          <a:srcRect l="1123" t="1436" r="86016" b="93173"/>
-          <a:stretch>
-            <a:fillRect/>
-          </a:stretch>
-        </p:blipFill>
-        <p:spPr bwMode="auto">
-          <a:xfrm>
-            <a:off x="-1" y="0"/>
-            <a:ext cx="1805777" cy="884117"/>
-          </a:xfrm>
-          <a:prstGeom prst="rect">
-            <a:avLst/>
-          </a:prstGeom>
-        </p:spPr>
-      </p:pic>
-      <p:sp>
-        <p:nvSpPr>
-          <p:cNvPr id="12" name="Google Shape;297;p9"/>
-          <p:cNvSpPr txBox="1">
-            <a:spLocks/>
-          </p:cNvSpPr>
-          <p:nvPr/>
-        </p:nvSpPr>
-        <p:spPr>
-          <a:xfrm>
-            <a:off x="1524000" y="442058"/>
-            <a:ext cx="6553200" cy="768000"/>
-          </a:xfrm>
-          <a:prstGeom prst="rect">
-            <a:avLst/>
-          </a:prstGeom>
-          <a:noFill/>
-          <a:ln>
-            <a:noFill/>
-          </a:ln>
-        </p:spPr>
-        <p:txBody>
-          <a:bodyPr spcFirstLastPara="1" vert="horz" wrap="square" lIns="91425" tIns="91425" rIns="91425" bIns="91425" rtlCol="0" anchor="ctr" anchorCtr="0">
-            <a:noAutofit/>
-          </a:bodyPr>
-          <a:lstStyle>
-            <a:lvl1pPr lvl="0" algn="ctr" defTabSz="914400" rtl="0" eaLnBrk="1" latinLnBrk="0" hangingPunct="1">
-              <a:lnSpc>
-                <a:spcPct val="100000"/>
-              </a:lnSpc>
-              <a:spcBef>
-                <a:spcPts val="0"/>
-              </a:spcBef>
-              <a:spcAft>
-                <a:spcPts val="0"/>
-              </a:spcAft>
-              <a:buSzPts val="2800"/>
-              <a:buNone/>
-              <a:defRPr sz="4400" kern="1200">
-                <a:solidFill>
-                  <a:schemeClr val="tx1"/>
-                </a:solidFill>
-                <a:latin typeface="+mj-lt"/>
-                <a:ea typeface="+mj-ea"/>
-                <a:cs typeface="+mj-cs"/>
-              </a:defRPr>
-            </a:lvl1pPr>
-            <a:lvl2pPr lvl="1" algn="l">
-              <a:lnSpc>
-                <a:spcPct val="100000"/>
-              </a:lnSpc>
-              <a:spcBef>
-                <a:spcPts val="0"/>
-              </a:spcBef>
-              <a:spcAft>
-                <a:spcPts val="0"/>
-              </a:spcAft>
-              <a:buSzPts val="2800"/>
-              <a:buNone/>
-              <a:defRPr/>
-            </a:lvl2pPr>
-            <a:lvl3pPr lvl="2" algn="l">
-              <a:lnSpc>
-                <a:spcPct val="100000"/>
-              </a:lnSpc>
-              <a:spcBef>
-                <a:spcPts val="0"/>
-              </a:spcBef>
-              <a:spcAft>
-                <a:spcPts val="0"/>
-              </a:spcAft>
-              <a:buSzPts val="2800"/>
-              <a:buNone/>
-              <a:defRPr/>
-            </a:lvl3pPr>
-            <a:lvl4pPr lvl="3" algn="l">
-              <a:lnSpc>
-                <a:spcPct val="100000"/>
-              </a:lnSpc>
-              <a:spcBef>
-                <a:spcPts val="0"/>
-              </a:spcBef>
-              <a:spcAft>
-                <a:spcPts val="0"/>
-              </a:spcAft>
-              <a:buSzPts val="2800"/>
-              <a:buNone/>
-              <a:defRPr/>
-            </a:lvl4pPr>
-            <a:lvl5pPr lvl="4" algn="l">
-              <a:lnSpc>
-                <a:spcPct val="100000"/>
-              </a:lnSpc>
-              <a:spcBef>
-                <a:spcPts val="0"/>
-              </a:spcBef>
-              <a:spcAft>
-                <a:spcPts val="0"/>
-              </a:spcAft>
-              <a:buSzPts val="2800"/>
-              <a:buNone/>
-              <a:defRPr/>
-            </a:lvl5pPr>
-            <a:lvl6pPr lvl="5" algn="l">
-              <a:lnSpc>
-                <a:spcPct val="100000"/>
-              </a:lnSpc>
-              <a:spcBef>
-                <a:spcPts val="0"/>
-              </a:spcBef>
-              <a:spcAft>
-                <a:spcPts val="0"/>
-              </a:spcAft>
-              <a:buSzPts val="2800"/>
-              <a:buNone/>
-              <a:defRPr/>
-            </a:lvl6pPr>
-            <a:lvl7pPr lvl="6" algn="l">
-              <a:lnSpc>
-                <a:spcPct val="100000"/>
-              </a:lnSpc>
-              <a:spcBef>
-                <a:spcPts val="0"/>
-              </a:spcBef>
-              <a:spcAft>
-                <a:spcPts val="0"/>
-              </a:spcAft>
-              <a:buSzPts val="2800"/>
-              <a:buNone/>
-              <a:defRPr/>
-            </a:lvl7pPr>
-            <a:lvl8pPr lvl="7" algn="l">
-              <a:lnSpc>
-                <a:spcPct val="100000"/>
-              </a:lnSpc>
-              <a:spcBef>
-                <a:spcPts val="0"/>
-              </a:spcBef>
-              <a:spcAft>
-                <a:spcPts val="0"/>
-              </a:spcAft>
-              <a:buSzPts val="2800"/>
-              <a:buNone/>
-              <a:defRPr/>
-            </a:lvl8pPr>
-            <a:lvl9pPr lvl="8" algn="l">
-              <a:lnSpc>
-                <a:spcPct val="100000"/>
-              </a:lnSpc>
-              <a:spcBef>
-                <a:spcPts val="0"/>
-              </a:spcBef>
-              <a:spcAft>
-                <a:spcPts val="0"/>
-              </a:spcAft>
-              <a:buSzPts val="2800"/>
-              <a:buNone/>
-              <a:defRPr/>
-            </a:lvl9pPr>
-          </a:lstStyle>
-          <a:p>
-            <a:r>
-              <a:rPr lang="en-GB" sz="3400" b="1" dirty="0" smtClean="0">
-                <a:solidFill>
-                  <a:schemeClr val="tx1">
-                    <a:lumMod val="50000"/>
-                  </a:schemeClr>
-                </a:solidFill>
-                <a:ea typeface="Times New Roman"/>
-                <a:cs typeface="Times New Roman"/>
-                <a:sym typeface="Times New Roman"/>
-              </a:rPr>
-              <a:t>3</a:t>
-            </a:r>
-            <a:r>
-              <a:rPr lang="en-GB" sz="3400" b="1" dirty="0">
-                <a:solidFill>
-                  <a:schemeClr val="tx1">
-                    <a:lumMod val="50000"/>
-                  </a:schemeClr>
-                </a:solidFill>
-                <a:ea typeface="Times New Roman"/>
-                <a:cs typeface="Times New Roman"/>
-                <a:sym typeface="Times New Roman"/>
-              </a:rPr>
-              <a:t>. Implementation of App SDR </a:t>
-            </a:r>
-          </a:p>
-        </p:txBody>
-      </p:sp>
-      <p:sp>
-        <p:nvSpPr>
-          <p:cNvPr id="8" name="TextBox 7"/>
-          <p:cNvSpPr txBox="1"/>
-          <p:nvPr/>
-        </p:nvSpPr>
-        <p:spPr>
-          <a:xfrm>
-            <a:off x="0" y="1219200"/>
-            <a:ext cx="6324600" cy="553998"/>
-          </a:xfrm>
-          <a:prstGeom prst="rect">
-            <a:avLst/>
-          </a:prstGeom>
-          <a:noFill/>
-        </p:spPr>
-        <p:txBody>
-          <a:bodyPr wrap="square" rtlCol="0">
-            <a:spAutoFit/>
-          </a:bodyPr>
-          <a:lstStyle/>
-          <a:p>
-            <a:r>
-              <a:rPr lang="en-GB" sz="3000" u="sng" dirty="0"/>
-              <a:t>b</a:t>
-            </a:r>
-            <a:r>
-              <a:rPr lang="en-GB" sz="3000" u="sng" dirty="0" smtClean="0"/>
-              <a:t>. SDR drawing library implementation</a:t>
-            </a:r>
-            <a:endParaRPr lang="en-GB" sz="3000" u="sng" dirty="0"/>
-          </a:p>
-        </p:txBody>
-      </p:sp>
       <p:pic>
         <p:nvPicPr>
           <p:cNvPr id="2" name="Picture 1"/>
@@ -19100,25 +19544,150 @@
             <a:pPr algn="ctr"/>
             <a:r>
               <a:rPr lang="en-GB" sz="1600" b="1" dirty="0" smtClean="0"/>
-              <a:t>Figure 3 : General </a:t>
-            </a:r>
-            <a:r>
-              <a:rPr lang="en-GB" sz="1600" b="1" dirty="0" smtClean="0"/>
-              <a:t>visualisation components of </a:t>
+              <a:t>Figure 3 : General visualisation components of </a:t>
             </a:r>
             <a:r>
               <a:rPr lang="en-GB" sz="1600" b="1" dirty="0" err="1" smtClean="0"/>
-              <a:t>SdrDrawer</a:t>
-            </a:r>
-            <a:r>
-              <a:rPr lang="en-GB" sz="1600" b="1" dirty="0" err="1" smtClean="0"/>
-              <a:t>Lib</a:t>
+              <a:t>SdrDrawerLib</a:t>
             </a:r>
             <a:r>
               <a:rPr lang="en-GB" sz="1600" b="1" dirty="0" smtClean="0"/>
               <a:t> library</a:t>
             </a:r>
             <a:endParaRPr lang="en-GB" sz="1600" b="1" dirty="0"/>
+          </a:p>
+        </p:txBody>
+      </p:sp>
+      <p:sp>
+        <p:nvSpPr>
+          <p:cNvPr id="9" name="TextBox 8"/>
+          <p:cNvSpPr txBox="1"/>
+          <p:nvPr/>
+        </p:nvSpPr>
+        <p:spPr>
+          <a:xfrm>
+            <a:off x="2362200" y="2429174"/>
+            <a:ext cx="6705600" cy="3046988"/>
+          </a:xfrm>
+          <a:prstGeom prst="rect">
+            <a:avLst/>
+          </a:prstGeom>
+          <a:noFill/>
+        </p:spPr>
+        <p:txBody>
+          <a:bodyPr wrap="square" rtlCol="0">
+            <a:spAutoFit/>
+          </a:bodyPr>
+          <a:lstStyle/>
+          <a:p>
+            <a:pPr>
+              <a:lnSpc>
+                <a:spcPct val="200000"/>
+              </a:lnSpc>
+            </a:pPr>
+            <a:r>
+              <a:rPr lang="en-GB" sz="1600" dirty="0"/>
+              <a:t>The primary idea of all drawing functions is based on three </a:t>
+            </a:r>
+            <a:r>
+              <a:rPr lang="en-GB" sz="1600" i="1" dirty="0" err="1"/>
+              <a:t>ICanvas</a:t>
+            </a:r>
+            <a:r>
+              <a:rPr lang="en-GB" sz="1600" dirty="0"/>
+              <a:t> methods:</a:t>
+            </a:r>
+          </a:p>
+          <a:p>
+            <a:pPr marL="285750" indent="-285750">
+              <a:lnSpc>
+                <a:spcPct val="200000"/>
+              </a:lnSpc>
+              <a:buFont typeface="Arial" pitchFamily="34" charset="0"/>
+              <a:buChar char="•"/>
+            </a:pPr>
+            <a:r>
+              <a:rPr lang="en-GB" sz="1600" dirty="0" err="1"/>
+              <a:t>DrawString</a:t>
+            </a:r>
+            <a:r>
+              <a:rPr lang="en-GB" sz="1600" dirty="0"/>
+              <a:t>(string value, float x, float y, </a:t>
+            </a:r>
+            <a:r>
+              <a:rPr lang="en-GB" sz="1600" dirty="0" err="1"/>
+              <a:t>HorizontalAlignment</a:t>
+            </a:r>
+            <a:r>
+              <a:rPr lang="en-GB" sz="1600" dirty="0"/>
+              <a:t> </a:t>
+            </a:r>
+            <a:r>
+              <a:rPr lang="en-GB" sz="1600" dirty="0" err="1"/>
+              <a:t>horizontalAlignment</a:t>
+            </a:r>
+            <a:r>
+              <a:rPr lang="en-GB" sz="1600" dirty="0"/>
+              <a:t>, </a:t>
+            </a:r>
+            <a:r>
+              <a:rPr lang="en-GB" sz="1600" dirty="0" err="1"/>
+              <a:t>VerticalAlignment</a:t>
+            </a:r>
+            <a:r>
+              <a:rPr lang="en-GB" sz="1600" dirty="0"/>
+              <a:t> </a:t>
+            </a:r>
+            <a:r>
+              <a:rPr lang="en-GB" sz="1600" dirty="0" err="1"/>
+              <a:t>verticalAlignment</a:t>
+            </a:r>
+            <a:r>
+              <a:rPr lang="en-GB" sz="1600" dirty="0"/>
+              <a:t>)</a:t>
+            </a:r>
+          </a:p>
+          <a:p>
+            <a:pPr marL="285750" indent="-285750">
+              <a:lnSpc>
+                <a:spcPct val="200000"/>
+              </a:lnSpc>
+              <a:buFont typeface="Arial" pitchFamily="34" charset="0"/>
+              <a:buChar char="•"/>
+            </a:pPr>
+            <a:r>
+              <a:rPr lang="en-GB" sz="1600" dirty="0" err="1"/>
+              <a:t>DrawRectangle</a:t>
+            </a:r>
+            <a:r>
+              <a:rPr lang="en-GB" sz="1600" dirty="0"/>
+              <a:t>(float x, float y, float width, float height)</a:t>
+            </a:r>
+          </a:p>
+          <a:p>
+            <a:pPr marL="285750" indent="-285750">
+              <a:lnSpc>
+                <a:spcPct val="200000"/>
+              </a:lnSpc>
+              <a:buFont typeface="Arial" pitchFamily="34" charset="0"/>
+              <a:buChar char="•"/>
+            </a:pPr>
+            <a:r>
+              <a:rPr lang="en-GB" sz="1600" dirty="0" err="1"/>
+              <a:t>DrawRoundedRectangle</a:t>
+            </a:r>
+            <a:r>
+              <a:rPr lang="en-GB" sz="1600" dirty="0"/>
+              <a:t>(float x, float y, float width, float height, float </a:t>
+            </a:r>
+            <a:r>
+              <a:rPr lang="en-GB" sz="1600" dirty="0" err="1"/>
+              <a:t>cornerRadius</a:t>
+            </a:r>
+            <a:r>
+              <a:rPr lang="en-GB" sz="1600" dirty="0"/>
+              <a:t>)</a:t>
+            </a:r>
           </a:p>
         </p:txBody>
       </p:sp>
@@ -19135,14 +19704,179 @@
   <p:timing>
     <p:tnLst>
       <p:par>
-        <p:cTn id="1" dur="indefinite" restart="never" nodeType="tmRoot"/>
+        <p:cTn id="1" dur="indefinite" restart="never" nodeType="tmRoot">
+          <p:childTnLst>
+            <p:seq concurrent="1" nextAc="seek">
+              <p:cTn id="2" dur="indefinite" nodeType="mainSeq">
+                <p:childTnLst>
+                  <p:par>
+                    <p:cTn id="3" fill="hold">
+                      <p:stCondLst>
+                        <p:cond delay="indefinite"/>
+                      </p:stCondLst>
+                      <p:childTnLst>
+                        <p:par>
+                          <p:cTn id="4" fill="hold">
+                            <p:stCondLst>
+                              <p:cond delay="0"/>
+                            </p:stCondLst>
+                            <p:childTnLst>
+                              <p:par>
+                                <p:cTn id="5" presetID="1" presetClass="entr" presetSubtype="0" fill="hold" nodeType="clickEffect">
+                                  <p:stCondLst>
+                                    <p:cond delay="0"/>
+                                  </p:stCondLst>
+                                  <p:childTnLst>
+                                    <p:set>
+                                      <p:cBhvr>
+                                        <p:cTn id="6" dur="1" fill="hold">
+                                          <p:stCondLst>
+                                            <p:cond delay="0"/>
+                                          </p:stCondLst>
+                                        </p:cTn>
+                                        <p:tgtEl>
+                                          <p:spTgt spid="9">
+                                            <p:txEl>
+                                              <p:pRg st="0" end="0"/>
+                                            </p:txEl>
+                                          </p:spTgt>
+                                        </p:tgtEl>
+                                        <p:attrNameLst>
+                                          <p:attrName>style.visibility</p:attrName>
+                                        </p:attrNameLst>
+                                      </p:cBhvr>
+                                      <p:to>
+                                        <p:strVal val="visible"/>
+                                      </p:to>
+                                    </p:set>
+                                  </p:childTnLst>
+                                </p:cTn>
+                              </p:par>
+                              <p:par>
+                                <p:cTn id="7" presetID="1" presetClass="entr" presetSubtype="0" fill="hold" nodeType="withEffect">
+                                  <p:stCondLst>
+                                    <p:cond delay="0"/>
+                                  </p:stCondLst>
+                                  <p:childTnLst>
+                                    <p:set>
+                                      <p:cBhvr>
+                                        <p:cTn id="8" dur="1" fill="hold">
+                                          <p:stCondLst>
+                                            <p:cond delay="0"/>
+                                          </p:stCondLst>
+                                        </p:cTn>
+                                        <p:tgtEl>
+                                          <p:spTgt spid="9">
+                                            <p:txEl>
+                                              <p:pRg st="2" end="2"/>
+                                            </p:txEl>
+                                          </p:spTgt>
+                                        </p:tgtEl>
+                                        <p:attrNameLst>
+                                          <p:attrName>style.visibility</p:attrName>
+                                        </p:attrNameLst>
+                                      </p:cBhvr>
+                                      <p:to>
+                                        <p:strVal val="visible"/>
+                                      </p:to>
+                                    </p:set>
+                                  </p:childTnLst>
+                                </p:cTn>
+                              </p:par>
+                              <p:par>
+                                <p:cTn id="9" presetID="1" presetClass="entr" presetSubtype="0" fill="hold" nodeType="withEffect">
+                                  <p:stCondLst>
+                                    <p:cond delay="0"/>
+                                  </p:stCondLst>
+                                  <p:childTnLst>
+                                    <p:set>
+                                      <p:cBhvr>
+                                        <p:cTn id="10" dur="1" fill="hold">
+                                          <p:stCondLst>
+                                            <p:cond delay="0"/>
+                                          </p:stCondLst>
+                                        </p:cTn>
+                                        <p:tgtEl>
+                                          <p:spTgt spid="9">
+                                            <p:txEl>
+                                              <p:pRg st="3" end="3"/>
+                                            </p:txEl>
+                                          </p:spTgt>
+                                        </p:tgtEl>
+                                        <p:attrNameLst>
+                                          <p:attrName>style.visibility</p:attrName>
+                                        </p:attrNameLst>
+                                      </p:cBhvr>
+                                      <p:to>
+                                        <p:strVal val="visible"/>
+                                      </p:to>
+                                    </p:set>
+                                  </p:childTnLst>
+                                </p:cTn>
+                              </p:par>
+                              <p:par>
+                                <p:cTn id="11" presetID="1" presetClass="entr" presetSubtype="0" fill="hold" nodeType="withEffect">
+                                  <p:stCondLst>
+                                    <p:cond delay="0"/>
+                                  </p:stCondLst>
+                                  <p:childTnLst>
+                                    <p:set>
+                                      <p:cBhvr>
+                                        <p:cTn id="12" dur="1" fill="hold">
+                                          <p:stCondLst>
+                                            <p:cond delay="0"/>
+                                          </p:stCondLst>
+                                        </p:cTn>
+                                        <p:tgtEl>
+                                          <p:spTgt spid="9">
+                                            <p:txEl>
+                                              <p:pRg st="1" end="1"/>
+                                            </p:txEl>
+                                          </p:spTgt>
+                                        </p:tgtEl>
+                                        <p:attrNameLst>
+                                          <p:attrName>style.visibility</p:attrName>
+                                        </p:attrNameLst>
+                                      </p:cBhvr>
+                                      <p:to>
+                                        <p:strVal val="visible"/>
+                                      </p:to>
+                                    </p:set>
+                                  </p:childTnLst>
+                                </p:cTn>
+                              </p:par>
+                            </p:childTnLst>
+                          </p:cTn>
+                        </p:par>
+                      </p:childTnLst>
+                    </p:cTn>
+                  </p:par>
+                </p:childTnLst>
+              </p:cTn>
+              <p:prevCondLst>
+                <p:cond evt="onPrev" delay="0">
+                  <p:tgtEl>
+                    <p:sldTgt/>
+                  </p:tgtEl>
+                </p:cond>
+              </p:prevCondLst>
+              <p:nextCondLst>
+                <p:cond evt="onNext" delay="0">
+                  <p:tgtEl>
+                    <p:sldTgt/>
+                  </p:tgtEl>
+                </p:cond>
+              </p:nextCondLst>
+            </p:seq>
+          </p:childTnLst>
+        </p:cTn>
       </p:par>
     </p:tnLst>
   </p:timing>
 </p:sld>
 </file>
 
-<file path=ppt/slides/slide9.xml><?xml version="1.0" encoding="utf-8"?>
+<file path=ppt/slides/slide8.xml><?xml version="1.0" encoding="utf-8"?>
 <p:sld xmlns:a="http://schemas.openxmlformats.org/drawingml/2006/main" xmlns:r="http://schemas.openxmlformats.org/officeDocument/2006/relationships" xmlns:p="http://schemas.openxmlformats.org/presentationml/2006/main">
   <p:cSld>
     <p:spTree>
@@ -19652,7 +20386,6 @@
               <a:rPr lang="en-GB" dirty="0"/>
               <a:t>MVVM for complex logic.</a:t>
             </a:r>
-            <a:endParaRPr lang="en-GB" dirty="0"/>
           </a:p>
         </p:txBody>
       </p:sp>
@@ -19789,6 +20522,104 @@
       <p:bldP spid="5" grpId="0"/>
       <p:bldP spid="7" grpId="0"/>
     </p:bldLst>
+  </p:timing>
+</p:sld>
+</file>
+
+<file path=ppt/slides/slide9.xml><?xml version="1.0" encoding="utf-8"?>
+<p:sld xmlns:a="http://schemas.openxmlformats.org/drawingml/2006/main" xmlns:r="http://schemas.openxmlformats.org/officeDocument/2006/relationships" xmlns:p="http://schemas.openxmlformats.org/presentationml/2006/main">
+  <p:cSld>
+    <p:spTree>
+      <p:nvGrpSpPr>
+        <p:cNvPr id="1" name=""/>
+        <p:cNvGrpSpPr/>
+        <p:nvPr/>
+      </p:nvGrpSpPr>
+      <p:grpSpPr>
+        <a:xfrm>
+          <a:off x="0" y="0"/>
+          <a:ext cx="0" cy="0"/>
+          <a:chOff x="0" y="0"/>
+          <a:chExt cx="0" cy="0"/>
+        </a:xfrm>
+      </p:grpSpPr>
+      <p:pic>
+        <p:nvPicPr>
+          <p:cNvPr id="4" name="Picture 3"/>
+          <p:cNvPicPr>
+            <a:picLocks noChangeAspect="1"/>
+          </p:cNvPicPr>
+          <p:nvPr/>
+        </p:nvPicPr>
+        <p:blipFill>
+          <a:blip r:embed="rId2">
+            <a:extLst>
+              <a:ext uri="{28A0092B-C50C-407E-A947-70E740481C1C}">
+                <a14:useLocalDpi xmlns:a14="http://schemas.microsoft.com/office/drawing/2010/main" val="0"/>
+              </a:ext>
+            </a:extLst>
+          </a:blip>
+          <a:stretch>
+            <a:fillRect/>
+          </a:stretch>
+        </p:blipFill>
+        <p:spPr>
+          <a:xfrm>
+            <a:off x="457200" y="304800"/>
+            <a:ext cx="8275013" cy="5789585"/>
+          </a:xfrm>
+          <a:prstGeom prst="rect">
+            <a:avLst/>
+          </a:prstGeom>
+        </p:spPr>
+      </p:pic>
+      <p:sp>
+        <p:nvSpPr>
+          <p:cNvPr id="6" name="TextBox 5"/>
+          <p:cNvSpPr txBox="1"/>
+          <p:nvPr/>
+        </p:nvSpPr>
+        <p:spPr>
+          <a:xfrm>
+            <a:off x="1652828" y="6231128"/>
+            <a:ext cx="5883756" cy="338554"/>
+          </a:xfrm>
+          <a:prstGeom prst="rect">
+            <a:avLst/>
+          </a:prstGeom>
+          <a:noFill/>
+        </p:spPr>
+        <p:txBody>
+          <a:bodyPr wrap="square" rtlCol="0">
+            <a:spAutoFit/>
+          </a:bodyPr>
+          <a:lstStyle/>
+          <a:p>
+            <a:pPr algn="ctr"/>
+            <a:r>
+              <a:rPr lang="en-GB" sz="1600" b="1" dirty="0" smtClean="0"/>
+              <a:t>Figure 3 : General structure and components logic implementation</a:t>
+            </a:r>
+            <a:endParaRPr lang="en-GB" sz="1600" b="1" dirty="0"/>
+          </a:p>
+        </p:txBody>
+      </p:sp>
+    </p:spTree>
+    <p:extLst>
+      <p:ext uri="{BB962C8B-B14F-4D97-AF65-F5344CB8AC3E}">
+        <p14:creationId xmlns:p14="http://schemas.microsoft.com/office/powerpoint/2010/main" val="595162780"/>
+      </p:ext>
+    </p:extLst>
+  </p:cSld>
+  <p:clrMapOvr>
+    <a:masterClrMapping/>
+  </p:clrMapOvr>
+  <p:timing>
+    <p:tnLst>
+      <p:par>
+        <p:cTn id="1" dur="indefinite" restart="never" nodeType="tmRoot"/>
+      </p:par>
+    </p:tnLst>
   </p:timing>
 </p:sld>
 </file>

</xml_diff>